<commit_message>
Update powerpoint with fixed prototype and slide sequence
Fixed the Amin’s Teacher Profile prototype, which had missing buttons.
Also added the graphical student home prototype as the last slide of
the presentation.
</commit_message>
<xml_diff>
--- a/documents/User_Interface_Prototype_Project_PhaseII_Elementary Engineers.pptx
+++ b/documents/User_Interface_Prototype_Project_PhaseII_Elementary Engineers.pptx
@@ -9,29 +9,28 @@
     <p:sldId id="270" r:id="rId3"/>
     <p:sldId id="257" r:id="rId4"/>
     <p:sldId id="272" r:id="rId5"/>
-    <p:sldId id="267" r:id="rId6"/>
-    <p:sldId id="271" r:id="rId7"/>
+    <p:sldId id="271" r:id="rId6"/>
+    <p:sldId id="267" r:id="rId7"/>
     <p:sldId id="268" r:id="rId8"/>
     <p:sldId id="273" r:id="rId9"/>
     <p:sldId id="274" r:id="rId10"/>
-    <p:sldId id="276" r:id="rId11"/>
-    <p:sldId id="277" r:id="rId12"/>
-    <p:sldId id="278" r:id="rId13"/>
-    <p:sldId id="279" r:id="rId14"/>
-    <p:sldId id="280" r:id="rId15"/>
-    <p:sldId id="281" r:id="rId16"/>
-    <p:sldId id="275" r:id="rId17"/>
-    <p:sldId id="283" r:id="rId18"/>
-    <p:sldId id="285" r:id="rId19"/>
+    <p:sldId id="285" r:id="rId11"/>
+    <p:sldId id="276" r:id="rId12"/>
+    <p:sldId id="277" r:id="rId13"/>
+    <p:sldId id="278" r:id="rId14"/>
+    <p:sldId id="279" r:id="rId15"/>
+    <p:sldId id="280" r:id="rId16"/>
+    <p:sldId id="288" r:id="rId17"/>
+    <p:sldId id="281" r:id="rId18"/>
+    <p:sldId id="282" r:id="rId19"/>
     <p:sldId id="286" r:id="rId20"/>
-    <p:sldId id="282" r:id="rId21"/>
-    <p:sldId id="284" r:id="rId22"/>
-    <p:sldId id="287" r:id="rId23"/>
-    <p:sldId id="288" r:id="rId24"/>
+    <p:sldId id="275" r:id="rId21"/>
+    <p:sldId id="287" r:id="rId22"/>
+    <p:sldId id="290" r:id="rId23"/>
+    <p:sldId id="291" r:id="rId24"/>
     <p:sldId id="289" r:id="rId25"/>
-    <p:sldId id="290" r:id="rId26"/>
-    <p:sldId id="291" r:id="rId27"/>
-    <p:sldId id="292" r:id="rId28"/>
+    <p:sldId id="292" r:id="rId26"/>
+    <p:sldId id="293" r:id="rId27"/>
   </p:sldIdLst>
   <p:sldSz cx="12192000" cy="6858000"/>
   <p:notesSz cx="6858000" cy="9144000"/>
@@ -132,7 +131,7 @@
   </p:defaultTextStyle>
   <p:extLst>
     <p:ext uri="{EFAFB233-063F-42B5-8137-9DF3F51BA10A}">
-      <p15:sldGuideLst xmlns:p15="http://schemas.microsoft.com/office/powerpoint/2012/main" xmlns="">
+      <p15:sldGuideLst xmlns:p15="http://schemas.microsoft.com/office/powerpoint/2012/main">
         <p15:guide id="1" orient="horz" pos="2160">
           <p15:clr>
             <a:srgbClr val="A4A3A4"/>
@@ -6026,11 +6025,7 @@
             </a:br>
             <a:r>
               <a:rPr lang="en-US" sz="4800" dirty="0" smtClean="0"/>
-              <a:t>project Phase II</a:t>
-            </a:r>
-            <a:r>
-              <a:rPr lang="en-US" sz="4800" dirty="0" smtClean="0"/>
-              <a:t> </a:t>
+              <a:t>project Phase II </a:t>
             </a:r>
             <a:endParaRPr lang="en-US" sz="4800" dirty="0"/>
           </a:p>
@@ -6061,7 +6056,7 @@
   <p:timing>
     <p:tnLst>
       <p:par>
-        <p:cTn xmlns:p14="http://schemas.microsoft.com/office/powerpoint/2010/main" id="1" dur="indefinite" restart="never" nodeType="tmRoot"/>
+        <p:cTn id="1" dur="indefinite" restart="never" nodeType="tmRoot"/>
       </p:par>
     </p:tnLst>
   </p:timing>
@@ -6097,8 +6092,8 @@
         </p:nvSpPr>
         <p:spPr>
           <a:xfrm>
-            <a:off x="2895600" y="359473"/>
-            <a:ext cx="8610600" cy="818419"/>
+            <a:off x="3310659" y="236423"/>
+            <a:ext cx="8423862" cy="1047780"/>
           </a:xfrm>
         </p:spPr>
         <p:txBody>
@@ -6107,7 +6102,7 @@
           <a:p>
             <a:r>
               <a:rPr lang="en-US" dirty="0" smtClean="0"/>
-              <a:t>Teacher Home</a:t>
+              <a:t>Teacher – force reset</a:t>
             </a:r>
             <a:endParaRPr lang="en-US" dirty="0"/>
           </a:p>
@@ -6125,22 +6120,22 @@
         </p:nvPicPr>
         <p:blipFill>
           <a:blip r:embed="rId2"/>
-          <a:srcRect l="-21118" r="-21118"/>
+          <a:srcRect l="-23550" r="-23550"/>
           <a:stretch>
             <a:fillRect/>
           </a:stretch>
         </p:blipFill>
         <p:spPr>
           <a:xfrm>
-            <a:off x="90842" y="1343532"/>
-            <a:ext cx="11853395" cy="5208491"/>
+            <a:off x="-153832" y="1481137"/>
+            <a:ext cx="11660032" cy="4954145"/>
           </a:xfrm>
         </p:spPr>
       </p:pic>
     </p:spTree>
     <p:extLst>
       <p:ext uri="{BB962C8B-B14F-4D97-AF65-F5344CB8AC3E}">
-        <p14:creationId xmlns:p14="http://schemas.microsoft.com/office/powerpoint/2010/main" val="3474715062"/>
+        <p14:creationId xmlns:p14="http://schemas.microsoft.com/office/powerpoint/2010/main" val="1206358408"/>
       </p:ext>
     </p:extLst>
   </p:cSld>
@@ -6191,8 +6186,8 @@
         </p:nvSpPr>
         <p:spPr>
           <a:xfrm>
-            <a:off x="2895600" y="322665"/>
-            <a:ext cx="8610600" cy="928846"/>
+            <a:off x="2895600" y="359473"/>
+            <a:ext cx="8610600" cy="818419"/>
           </a:xfrm>
         </p:spPr>
         <p:txBody>
@@ -6201,11 +6196,7 @@
           <a:p>
             <a:r>
               <a:rPr lang="en-US" dirty="0" smtClean="0"/>
-              <a:t>Teacher – Worksheet </a:t>
-            </a:r>
-            <a:r>
-              <a:rPr lang="en-US" dirty="0" err="1" smtClean="0"/>
-              <a:t>HIstory</a:t>
+              <a:t>Teacher Home</a:t>
             </a:r>
             <a:endParaRPr lang="en-US" dirty="0"/>
           </a:p>
@@ -6223,22 +6214,22 @@
         </p:nvPicPr>
         <p:blipFill>
           <a:blip r:embed="rId2"/>
-          <a:srcRect l="-22647" r="-22647"/>
+          <a:srcRect l="-21118" r="-21118"/>
           <a:stretch>
             <a:fillRect/>
           </a:stretch>
         </p:blipFill>
         <p:spPr>
           <a:xfrm>
-            <a:off x="312909" y="1403284"/>
-            <a:ext cx="12111217" cy="5093526"/>
+            <a:off x="90842" y="1343532"/>
+            <a:ext cx="11853395" cy="5208491"/>
           </a:xfrm>
         </p:spPr>
       </p:pic>
     </p:spTree>
     <p:extLst>
       <p:ext uri="{BB962C8B-B14F-4D97-AF65-F5344CB8AC3E}">
-        <p14:creationId xmlns:p14="http://schemas.microsoft.com/office/powerpoint/2010/main" val="2295249284"/>
+        <p14:creationId xmlns:p14="http://schemas.microsoft.com/office/powerpoint/2010/main" val="3474715062"/>
       </p:ext>
     </p:extLst>
   </p:cSld>
@@ -6289,8 +6280,8 @@
         </p:nvSpPr>
         <p:spPr>
           <a:xfrm>
-            <a:off x="2895600" y="267450"/>
-            <a:ext cx="8610600" cy="855228"/>
+            <a:off x="2895600" y="322665"/>
+            <a:ext cx="8610600" cy="928846"/>
           </a:xfrm>
         </p:spPr>
         <p:txBody>
@@ -6299,7 +6290,11 @@
           <a:p>
             <a:r>
               <a:rPr lang="en-US" dirty="0" smtClean="0"/>
-              <a:t>Teacher - Classes</a:t>
+              <a:t>Teacher – Worksheet </a:t>
+            </a:r>
+            <a:r>
+              <a:rPr lang="en-US" dirty="0" err="1" smtClean="0"/>
+              <a:t>HIstory</a:t>
             </a:r>
             <a:endParaRPr lang="en-US" dirty="0"/>
           </a:p>
@@ -6317,22 +6312,22 @@
         </p:nvPicPr>
         <p:blipFill>
           <a:blip r:embed="rId2"/>
-          <a:srcRect l="-19359" r="-19359"/>
+          <a:srcRect l="-22647" r="-22647"/>
           <a:stretch>
             <a:fillRect/>
           </a:stretch>
         </p:blipFill>
         <p:spPr>
           <a:xfrm>
-            <a:off x="0" y="1343025"/>
-            <a:ext cx="11743342" cy="5184205"/>
+            <a:off x="312909" y="1403284"/>
+            <a:ext cx="12111217" cy="5093526"/>
           </a:xfrm>
         </p:spPr>
       </p:pic>
     </p:spTree>
     <p:extLst>
       <p:ext uri="{BB962C8B-B14F-4D97-AF65-F5344CB8AC3E}">
-        <p14:creationId xmlns:p14="http://schemas.microsoft.com/office/powerpoint/2010/main" val="386809513"/>
+        <p14:creationId xmlns:p14="http://schemas.microsoft.com/office/powerpoint/2010/main" val="2295249284"/>
       </p:ext>
     </p:extLst>
   </p:cSld>
@@ -6383,8 +6378,8 @@
         </p:nvSpPr>
         <p:spPr>
           <a:xfrm>
-            <a:off x="2895600" y="396281"/>
-            <a:ext cx="8610600" cy="984061"/>
+            <a:off x="2895600" y="267450"/>
+            <a:ext cx="8610600" cy="855228"/>
           </a:xfrm>
         </p:spPr>
         <p:txBody>
@@ -6393,7 +6388,7 @@
           <a:p>
             <a:r>
               <a:rPr lang="en-US" dirty="0" smtClean="0"/>
-              <a:t>Teacher – Adding a New Class</a:t>
+              <a:t>Teacher - Classes</a:t>
             </a:r>
             <a:endParaRPr lang="en-US" dirty="0"/>
           </a:p>
@@ -6411,22 +6406,22 @@
         </p:nvPicPr>
         <p:blipFill>
           <a:blip r:embed="rId2"/>
-          <a:srcRect l="-21285" r="-21285"/>
+          <a:srcRect l="-19359" r="-19359"/>
           <a:stretch>
             <a:fillRect/>
           </a:stretch>
         </p:blipFill>
         <p:spPr>
           <a:xfrm>
-            <a:off x="296535" y="1380341"/>
-            <a:ext cx="11587335" cy="5079659"/>
+            <a:off x="0" y="1343025"/>
+            <a:ext cx="11743342" cy="5184205"/>
           </a:xfrm>
         </p:spPr>
       </p:pic>
     </p:spTree>
     <p:extLst>
       <p:ext uri="{BB962C8B-B14F-4D97-AF65-F5344CB8AC3E}">
-        <p14:creationId xmlns:p14="http://schemas.microsoft.com/office/powerpoint/2010/main" val="3397336195"/>
+        <p14:creationId xmlns:p14="http://schemas.microsoft.com/office/powerpoint/2010/main" val="386809513"/>
       </p:ext>
     </p:extLst>
   </p:cSld>
@@ -6477,8 +6472,8 @@
         </p:nvSpPr>
         <p:spPr>
           <a:xfrm>
-            <a:off x="2895600" y="285854"/>
-            <a:ext cx="8610600" cy="1293028"/>
+            <a:off x="2895600" y="396281"/>
+            <a:ext cx="8610600" cy="984061"/>
           </a:xfrm>
         </p:spPr>
         <p:txBody>
@@ -6487,7 +6482,7 @@
           <a:p>
             <a:r>
               <a:rPr lang="en-US" dirty="0" smtClean="0"/>
-              <a:t>Teacher  - Edit Class</a:t>
+              <a:t>Teacher – Adding a New Class</a:t>
             </a:r>
             <a:endParaRPr lang="en-US" dirty="0"/>
           </a:p>
@@ -6505,22 +6500,22 @@
         </p:nvPicPr>
         <p:blipFill>
           <a:blip r:embed="rId2"/>
-          <a:srcRect l="-24817" r="-24817"/>
+          <a:srcRect l="-21285" r="-21285"/>
           <a:stretch>
             <a:fillRect/>
           </a:stretch>
         </p:blipFill>
         <p:spPr>
           <a:xfrm>
-            <a:off x="91264" y="1578882"/>
-            <a:ext cx="11994465" cy="5009951"/>
+            <a:off x="296535" y="1380341"/>
+            <a:ext cx="11587335" cy="5079659"/>
           </a:xfrm>
         </p:spPr>
       </p:pic>
     </p:spTree>
     <p:extLst>
       <p:ext uri="{BB962C8B-B14F-4D97-AF65-F5344CB8AC3E}">
-        <p14:creationId xmlns:p14="http://schemas.microsoft.com/office/powerpoint/2010/main" val="1567482601"/>
+        <p14:creationId xmlns:p14="http://schemas.microsoft.com/office/powerpoint/2010/main" val="3397336195"/>
       </p:ext>
     </p:extLst>
   </p:cSld>
@@ -6571,8 +6566,8 @@
         </p:nvSpPr>
         <p:spPr>
           <a:xfrm>
-            <a:off x="2895600" y="267450"/>
-            <a:ext cx="8610600" cy="1039274"/>
+            <a:off x="2895600" y="285854"/>
+            <a:ext cx="8610600" cy="1293028"/>
           </a:xfrm>
         </p:spPr>
         <p:txBody>
@@ -6581,7 +6576,7 @@
           <a:p>
             <a:r>
               <a:rPr lang="en-US" dirty="0" smtClean="0"/>
-              <a:t>Teacher – class roster</a:t>
+              <a:t>Teacher  - Edit Class</a:t>
             </a:r>
             <a:endParaRPr lang="en-US" dirty="0"/>
           </a:p>
@@ -6599,22 +6594,22 @@
         </p:nvPicPr>
         <p:blipFill>
           <a:blip r:embed="rId2"/>
-          <a:srcRect l="-21573" r="-21573"/>
+          <a:srcRect l="-24817" r="-24817"/>
           <a:stretch>
             <a:fillRect/>
           </a:stretch>
         </p:blipFill>
         <p:spPr>
           <a:xfrm>
-            <a:off x="-84525" y="1306724"/>
-            <a:ext cx="12276525" cy="5360173"/>
+            <a:off x="91264" y="1578882"/>
+            <a:ext cx="11994465" cy="5009951"/>
           </a:xfrm>
         </p:spPr>
       </p:pic>
     </p:spTree>
     <p:extLst>
       <p:ext uri="{BB962C8B-B14F-4D97-AF65-F5344CB8AC3E}">
-        <p14:creationId xmlns:p14="http://schemas.microsoft.com/office/powerpoint/2010/main" val="296758909"/>
+        <p14:creationId xmlns:p14="http://schemas.microsoft.com/office/powerpoint/2010/main" val="1567482601"/>
       </p:ext>
     </p:extLst>
   </p:cSld>
@@ -6665,19 +6660,17 @@
         </p:nvSpPr>
         <p:spPr>
           <a:xfrm>
-            <a:off x="3024445" y="304259"/>
-            <a:ext cx="8610600" cy="763206"/>
-          </a:xfrm>
-        </p:spPr>
-        <p:txBody>
-          <a:bodyPr>
-            <a:normAutofit fontScale="90000"/>
-          </a:bodyPr>
+            <a:off x="2895600" y="322036"/>
+            <a:ext cx="8610600" cy="862284"/>
+          </a:xfrm>
+        </p:spPr>
+        <p:txBody>
+          <a:bodyPr/>
           <a:lstStyle/>
           <a:p>
             <a:r>
               <a:rPr lang="en-US" dirty="0" smtClean="0"/>
-              <a:t>Teacher – Student Password reset</a:t>
+              <a:t>Student registration</a:t>
             </a:r>
             <a:endParaRPr lang="en-US" dirty="0"/>
           </a:p>
@@ -6695,22 +6688,22 @@
         </p:nvPicPr>
         <p:blipFill>
           <a:blip r:embed="rId2"/>
-          <a:srcRect l="-21814" r="-21814"/>
+          <a:srcRect l="-22647" r="-22647"/>
           <a:stretch>
             <a:fillRect/>
           </a:stretch>
         </p:blipFill>
         <p:spPr>
           <a:xfrm>
-            <a:off x="0" y="1455037"/>
-            <a:ext cx="12192000" cy="5133795"/>
+            <a:off x="221655" y="1524000"/>
+            <a:ext cx="11579701" cy="4981174"/>
           </a:xfrm>
         </p:spPr>
       </p:pic>
     </p:spTree>
     <p:extLst>
       <p:ext uri="{BB962C8B-B14F-4D97-AF65-F5344CB8AC3E}">
-        <p14:creationId xmlns:p14="http://schemas.microsoft.com/office/powerpoint/2010/main" val="2743950604"/>
+        <p14:creationId xmlns:p14="http://schemas.microsoft.com/office/powerpoint/2010/main" val="3619587140"/>
       </p:ext>
     </p:extLst>
   </p:cSld>
@@ -6762,7 +6755,7 @@
         <p:spPr>
           <a:xfrm>
             <a:off x="2895600" y="267450"/>
-            <a:ext cx="8610600" cy="855228"/>
+            <a:ext cx="8610600" cy="1039274"/>
           </a:xfrm>
         </p:spPr>
         <p:txBody>
@@ -6771,7 +6764,7 @@
           <a:p>
             <a:r>
               <a:rPr lang="en-US" dirty="0" smtClean="0"/>
-              <a:t>Teacher - Classes</a:t>
+              <a:t>Teacher – class roster</a:t>
             </a:r>
             <a:endParaRPr lang="en-US" dirty="0"/>
           </a:p>
@@ -6789,22 +6782,22 @@
         </p:nvPicPr>
         <p:blipFill>
           <a:blip r:embed="rId2"/>
-          <a:srcRect l="-19359" r="-19359"/>
+          <a:srcRect l="-21573" r="-21573"/>
           <a:stretch>
             <a:fillRect/>
           </a:stretch>
         </p:blipFill>
         <p:spPr>
           <a:xfrm>
-            <a:off x="0" y="1343025"/>
-            <a:ext cx="11743342" cy="5184205"/>
+            <a:off x="-84525" y="1306724"/>
+            <a:ext cx="12276525" cy="5360173"/>
           </a:xfrm>
         </p:spPr>
       </p:pic>
     </p:spTree>
     <p:extLst>
       <p:ext uri="{BB962C8B-B14F-4D97-AF65-F5344CB8AC3E}">
-        <p14:creationId xmlns:p14="http://schemas.microsoft.com/office/powerpoint/2010/main" val="2273101411"/>
+        <p14:creationId xmlns:p14="http://schemas.microsoft.com/office/powerpoint/2010/main" val="296758909"/>
       </p:ext>
     </p:extLst>
   </p:cSld>
@@ -6855,8 +6848,8 @@
         </p:nvSpPr>
         <p:spPr>
           <a:xfrm>
-            <a:off x="3310659" y="236423"/>
-            <a:ext cx="8423862" cy="1047780"/>
+            <a:off x="2895600" y="377877"/>
+            <a:ext cx="8610600" cy="910442"/>
           </a:xfrm>
         </p:spPr>
         <p:txBody>
@@ -6865,7 +6858,7 @@
           <a:p>
             <a:r>
               <a:rPr lang="en-US" dirty="0" smtClean="0"/>
-              <a:t>Teacher – force reset</a:t>
+              <a:t>Teacher – student profile</a:t>
             </a:r>
             <a:endParaRPr lang="en-US" dirty="0"/>
           </a:p>
@@ -6883,22 +6876,22 @@
         </p:nvPicPr>
         <p:blipFill>
           <a:blip r:embed="rId2"/>
-          <a:srcRect l="-23550" r="-23550"/>
+          <a:srcRect l="-21814" r="-21814"/>
           <a:stretch>
             <a:fillRect/>
           </a:stretch>
         </p:blipFill>
         <p:spPr>
           <a:xfrm>
-            <a:off x="-153832" y="1481137"/>
-            <a:ext cx="11660032" cy="4954145"/>
+            <a:off x="257691" y="1509713"/>
+            <a:ext cx="11248509" cy="4894818"/>
           </a:xfrm>
         </p:spPr>
       </p:pic>
     </p:spTree>
     <p:extLst>
       <p:ext uri="{BB962C8B-B14F-4D97-AF65-F5344CB8AC3E}">
-        <p14:creationId xmlns:p14="http://schemas.microsoft.com/office/powerpoint/2010/main" val="1206358408"/>
+        <p14:creationId xmlns:p14="http://schemas.microsoft.com/office/powerpoint/2010/main" val="1068767978"/>
       </p:ext>
     </p:extLst>
   </p:cSld>
@@ -7147,17 +7140,19 @@
         </p:nvSpPr>
         <p:spPr>
           <a:xfrm>
-            <a:off x="2895600" y="377877"/>
-            <a:ext cx="8610600" cy="910442"/>
-          </a:xfrm>
-        </p:spPr>
-        <p:txBody>
-          <a:bodyPr/>
+            <a:off x="3024445" y="304259"/>
+            <a:ext cx="8610600" cy="763206"/>
+          </a:xfrm>
+        </p:spPr>
+        <p:txBody>
+          <a:bodyPr>
+            <a:normAutofit fontScale="90000"/>
+          </a:bodyPr>
           <a:lstStyle/>
           <a:p>
             <a:r>
               <a:rPr lang="en-US" dirty="0" smtClean="0"/>
-              <a:t>Teacher – student profile</a:t>
+              <a:t>Teacher – Student Password reset</a:t>
             </a:r>
             <a:endParaRPr lang="en-US" dirty="0"/>
           </a:p>
@@ -7182,15 +7177,15 @@
         </p:blipFill>
         <p:spPr>
           <a:xfrm>
-            <a:off x="257691" y="1509713"/>
-            <a:ext cx="11248509" cy="4894818"/>
+            <a:off x="0" y="1455037"/>
+            <a:ext cx="12192000" cy="5133795"/>
           </a:xfrm>
         </p:spPr>
       </p:pic>
     </p:spTree>
     <p:extLst>
       <p:ext uri="{BB962C8B-B14F-4D97-AF65-F5344CB8AC3E}">
-        <p14:creationId xmlns:p14="http://schemas.microsoft.com/office/powerpoint/2010/main" val="1068767978"/>
+        <p14:creationId xmlns:p14="http://schemas.microsoft.com/office/powerpoint/2010/main" val="2743950604"/>
       </p:ext>
     </p:extLst>
   </p:cSld>
@@ -7241,8 +7236,8 @@
         </p:nvSpPr>
         <p:spPr>
           <a:xfrm>
-            <a:off x="2895600" y="359473"/>
-            <a:ext cx="8610600" cy="984060"/>
+            <a:off x="2895600" y="117859"/>
+            <a:ext cx="8610600" cy="1023655"/>
           </a:xfrm>
         </p:spPr>
         <p:txBody>
@@ -7251,7 +7246,7 @@
           <a:p>
             <a:r>
               <a:rPr lang="en-US" dirty="0" smtClean="0"/>
-              <a:t>Teacher  - worksheet history</a:t>
+              <a:t>Student  - home</a:t>
             </a:r>
             <a:endParaRPr lang="en-US" dirty="0"/>
           </a:p>
@@ -7269,22 +7264,22 @@
         </p:nvPicPr>
         <p:blipFill>
           <a:blip r:embed="rId2"/>
-          <a:srcRect l="-21000" r="-21000"/>
+          <a:srcRect l="-15701" r="-15701"/>
           <a:stretch>
             <a:fillRect/>
           </a:stretch>
         </p:blipFill>
         <p:spPr>
           <a:xfrm>
-            <a:off x="5267" y="1343532"/>
-            <a:ext cx="11848513" cy="5215015"/>
+            <a:off x="331598" y="1369816"/>
+            <a:ext cx="11041252" cy="5251647"/>
           </a:xfrm>
         </p:spPr>
       </p:pic>
     </p:spTree>
     <p:extLst>
       <p:ext uri="{BB962C8B-B14F-4D97-AF65-F5344CB8AC3E}">
-        <p14:creationId xmlns:p14="http://schemas.microsoft.com/office/powerpoint/2010/main" val="1563929352"/>
+        <p14:creationId xmlns:p14="http://schemas.microsoft.com/office/powerpoint/2010/main" val="3287658632"/>
       </p:ext>
     </p:extLst>
   </p:cSld>
@@ -7335,8 +7330,8 @@
         </p:nvSpPr>
         <p:spPr>
           <a:xfrm>
-            <a:off x="2895600" y="117859"/>
-            <a:ext cx="8610600" cy="1023655"/>
+            <a:off x="3153688" y="350574"/>
+            <a:ext cx="8352512" cy="947898"/>
           </a:xfrm>
         </p:spPr>
         <p:txBody>
@@ -7345,7 +7340,7 @@
           <a:p>
             <a:r>
               <a:rPr lang="en-US" dirty="0" smtClean="0"/>
-              <a:t>Student  - home</a:t>
+              <a:t>All users - tutorials</a:t>
             </a:r>
             <a:endParaRPr lang="en-US" dirty="0"/>
           </a:p>
@@ -7363,22 +7358,22 @@
         </p:nvPicPr>
         <p:blipFill>
           <a:blip r:embed="rId2"/>
-          <a:srcRect l="-15701" r="-15701"/>
+          <a:srcRect l="-20389" r="-20389"/>
           <a:stretch>
             <a:fillRect/>
           </a:stretch>
         </p:blipFill>
         <p:spPr>
           <a:xfrm>
-            <a:off x="331598" y="1369816"/>
-            <a:ext cx="11041252" cy="5251647"/>
+            <a:off x="282817" y="1438275"/>
+            <a:ext cx="11223383" cy="4982739"/>
           </a:xfrm>
         </p:spPr>
       </p:pic>
     </p:spTree>
     <p:extLst>
       <p:ext uri="{BB962C8B-B14F-4D97-AF65-F5344CB8AC3E}">
-        <p14:creationId xmlns:p14="http://schemas.microsoft.com/office/powerpoint/2010/main" val="3287658632"/>
+        <p14:creationId xmlns:p14="http://schemas.microsoft.com/office/powerpoint/2010/main" val="1529212874"/>
       </p:ext>
     </p:extLst>
   </p:cSld>
@@ -7429,8 +7424,8 @@
         </p:nvSpPr>
         <p:spPr>
           <a:xfrm>
-            <a:off x="2895600" y="322036"/>
-            <a:ext cx="8610600" cy="862284"/>
+            <a:off x="3210768" y="264961"/>
+            <a:ext cx="8295432" cy="976435"/>
           </a:xfrm>
         </p:spPr>
         <p:txBody>
@@ -7439,7 +7434,7 @@
           <a:p>
             <a:r>
               <a:rPr lang="en-US" dirty="0" smtClean="0"/>
-              <a:t>Student registration</a:t>
+              <a:t>Single tutorial</a:t>
             </a:r>
             <a:endParaRPr lang="en-US" dirty="0"/>
           </a:p>
@@ -7457,22 +7452,22 @@
         </p:nvPicPr>
         <p:blipFill>
           <a:blip r:embed="rId2"/>
-          <a:srcRect l="-22647" r="-22647"/>
+          <a:srcRect l="-22903" r="-22903"/>
           <a:stretch>
             <a:fillRect/>
           </a:stretch>
         </p:blipFill>
         <p:spPr>
           <a:xfrm>
-            <a:off x="221655" y="1524000"/>
-            <a:ext cx="11579701" cy="4981174"/>
+            <a:off x="-88302" y="1412624"/>
+            <a:ext cx="11718328" cy="5023102"/>
           </a:xfrm>
         </p:spPr>
       </p:pic>
     </p:spTree>
     <p:extLst>
       <p:ext uri="{BB962C8B-B14F-4D97-AF65-F5344CB8AC3E}">
-        <p14:creationId xmlns:p14="http://schemas.microsoft.com/office/powerpoint/2010/main" val="3619587140"/>
+        <p14:creationId xmlns:p14="http://schemas.microsoft.com/office/powerpoint/2010/main" val="51864230"/>
       </p:ext>
     </p:extLst>
   </p:cSld>
@@ -7617,8 +7612,8 @@
         </p:nvSpPr>
         <p:spPr>
           <a:xfrm>
-            <a:off x="3153688" y="350574"/>
-            <a:ext cx="8352512" cy="947898"/>
+            <a:off x="2895600" y="307768"/>
+            <a:ext cx="8610600" cy="1004973"/>
           </a:xfrm>
         </p:spPr>
         <p:txBody>
@@ -7627,7 +7622,7 @@
           <a:p>
             <a:r>
               <a:rPr lang="en-US" dirty="0" smtClean="0"/>
-              <a:t>All users - tutorials</a:t>
+              <a:t>help</a:t>
             </a:r>
             <a:endParaRPr lang="en-US" dirty="0"/>
           </a:p>
@@ -7645,22 +7640,22 @@
         </p:nvPicPr>
         <p:blipFill>
           <a:blip r:embed="rId2"/>
-          <a:srcRect l="-20389" r="-20389"/>
+          <a:srcRect l="-21228" r="-21228"/>
           <a:stretch>
             <a:fillRect/>
           </a:stretch>
         </p:blipFill>
         <p:spPr>
           <a:xfrm>
-            <a:off x="282817" y="1438275"/>
-            <a:ext cx="11223383" cy="4982739"/>
+            <a:off x="-40281" y="1312741"/>
+            <a:ext cx="11805825" cy="5179617"/>
           </a:xfrm>
         </p:spPr>
       </p:pic>
     </p:spTree>
     <p:extLst>
       <p:ext uri="{BB962C8B-B14F-4D97-AF65-F5344CB8AC3E}">
-        <p14:creationId xmlns:p14="http://schemas.microsoft.com/office/powerpoint/2010/main" val="1529212874"/>
+        <p14:creationId xmlns:p14="http://schemas.microsoft.com/office/powerpoint/2010/main" val="1678947127"/>
       </p:ext>
     </p:extLst>
   </p:cSld>
@@ -7711,8 +7706,8 @@
         </p:nvSpPr>
         <p:spPr>
           <a:xfrm>
-            <a:off x="3210768" y="264961"/>
-            <a:ext cx="8295432" cy="976435"/>
+            <a:off x="5758611" y="0"/>
+            <a:ext cx="5705168" cy="1293028"/>
           </a:xfrm>
         </p:spPr>
         <p:txBody>
@@ -7720,8 +7715,12 @@
           <a:lstStyle/>
           <a:p>
             <a:r>
+              <a:rPr lang="en-US" smtClean="0"/>
+              <a:t>Graphical </a:t>
+            </a:r>
+            <a:r>
               <a:rPr lang="en-US" dirty="0" smtClean="0"/>
-              <a:t>Single tutorial</a:t>
+              <a:t>Mockup</a:t>
             </a:r>
             <a:endParaRPr lang="en-US" dirty="0"/>
           </a:p>
@@ -7738,117 +7737,28 @@
           </p:nvPr>
         </p:nvPicPr>
         <p:blipFill>
-          <a:blip r:embed="rId2"/>
-          <a:srcRect l="-22903" r="-22903"/>
+          <a:blip r:embed="rId2">
+            <a:extLst>
+              <a:ext uri="{28A0092B-C50C-407E-A947-70E740481C1C}">
+                <a14:useLocalDpi xmlns:a14="http://schemas.microsoft.com/office/drawing/2010/main" val="0"/>
+              </a:ext>
+            </a:extLst>
+          </a:blip>
           <a:stretch>
             <a:fillRect/>
           </a:stretch>
         </p:blipFill>
         <p:spPr>
           <a:xfrm>
-            <a:off x="-88302" y="1412624"/>
-            <a:ext cx="11718328" cy="5023102"/>
+            <a:off x="2513676" y="1106215"/>
+            <a:ext cx="6974649" cy="5579720"/>
           </a:xfrm>
         </p:spPr>
       </p:pic>
     </p:spTree>
     <p:extLst>
       <p:ext uri="{BB962C8B-B14F-4D97-AF65-F5344CB8AC3E}">
-        <p14:creationId xmlns:p14="http://schemas.microsoft.com/office/powerpoint/2010/main" val="51864230"/>
-      </p:ext>
-    </p:extLst>
-  </p:cSld>
-  <p:clrMapOvr>
-    <a:masterClrMapping/>
-  </p:clrMapOvr>
-  <mc:AlternateContent xmlns:mc="http://schemas.openxmlformats.org/markup-compatibility/2006" xmlns:p14="http://schemas.microsoft.com/office/powerpoint/2010/main">
-    <mc:Choice Requires="p14">
-      <p:transition spd="slow">
-        <p14:reveal/>
-      </p:transition>
-    </mc:Choice>
-    <mc:Fallback xmlns="">
-      <p:transition spd="slow">
-        <p:fade/>
-      </p:transition>
-    </mc:Fallback>
-  </mc:AlternateContent>
-</p:sld>
-</file>
-
-<file path=ppt/slides/slide27.xml><?xml version="1.0" encoding="utf-8"?>
-<p:sld xmlns:a="http://schemas.openxmlformats.org/drawingml/2006/main" xmlns:r="http://schemas.openxmlformats.org/officeDocument/2006/relationships" xmlns:p="http://schemas.openxmlformats.org/presentationml/2006/main">
-  <p:cSld>
-    <p:spTree>
-      <p:nvGrpSpPr>
-        <p:cNvPr id="1" name=""/>
-        <p:cNvGrpSpPr/>
-        <p:nvPr/>
-      </p:nvGrpSpPr>
-      <p:grpSpPr>
-        <a:xfrm>
-          <a:off x="0" y="0"/>
-          <a:ext cx="0" cy="0"/>
-          <a:chOff x="0" y="0"/>
-          <a:chExt cx="0" cy="0"/>
-        </a:xfrm>
-      </p:grpSpPr>
-      <p:sp>
-        <p:nvSpPr>
-          <p:cNvPr id="2" name="Title 1"/>
-          <p:cNvSpPr>
-            <a:spLocks noGrp="1"/>
-          </p:cNvSpPr>
-          <p:nvPr>
-            <p:ph type="title"/>
-          </p:nvPr>
-        </p:nvSpPr>
-        <p:spPr>
-          <a:xfrm>
-            <a:off x="2895600" y="307768"/>
-            <a:ext cx="8610600" cy="1004973"/>
-          </a:xfrm>
-        </p:spPr>
-        <p:txBody>
-          <a:bodyPr/>
-          <a:lstStyle/>
-          <a:p>
-            <a:r>
-              <a:rPr lang="en-US" dirty="0" smtClean="0"/>
-              <a:t>help</a:t>
-            </a:r>
-            <a:endParaRPr lang="en-US" dirty="0"/>
-          </a:p>
-        </p:txBody>
-      </p:sp>
-      <p:pic>
-        <p:nvPicPr>
-          <p:cNvPr id="4" name="Content Placeholder 3"/>
-          <p:cNvPicPr>
-            <a:picLocks noGrp="1" noChangeAspect="1"/>
-          </p:cNvPicPr>
-          <p:nvPr>
-            <p:ph idx="1"/>
-          </p:nvPr>
-        </p:nvPicPr>
-        <p:blipFill>
-          <a:blip r:embed="rId2"/>
-          <a:srcRect l="-21228" r="-21228"/>
-          <a:stretch>
-            <a:fillRect/>
-          </a:stretch>
-        </p:blipFill>
-        <p:spPr>
-          <a:xfrm>
-            <a:off x="-40281" y="1312741"/>
-            <a:ext cx="11805825" cy="5179617"/>
-          </a:xfrm>
-        </p:spPr>
-      </p:pic>
-    </p:spTree>
-    <p:extLst>
-      <p:ext uri="{BB962C8B-B14F-4D97-AF65-F5344CB8AC3E}">
-        <p14:creationId xmlns:p14="http://schemas.microsoft.com/office/powerpoint/2010/main" val="1678947127"/>
+        <p14:creationId xmlns:p14="http://schemas.microsoft.com/office/powerpoint/2010/main" val="885563974"/>
       </p:ext>
     </p:extLst>
   </p:cSld>
@@ -7964,7 +7874,7 @@
   <p:timing>
     <p:tnLst>
       <p:par>
-        <p:cTn xmlns:p14="http://schemas.microsoft.com/office/powerpoint/2010/main" id="1" dur="indefinite" restart="never" nodeType="tmRoot"/>
+        <p:cTn id="1" dur="indefinite" restart="never" nodeType="tmRoot"/>
       </p:par>
     </p:tnLst>
   </p:timing>
@@ -8065,7 +7975,7 @@
   <p:timing>
     <p:tnLst>
       <p:par>
-        <p:cTn xmlns:p14="http://schemas.microsoft.com/office/powerpoint/2010/main" id="1" dur="indefinite" restart="never" nodeType="tmRoot"/>
+        <p:cTn id="1" dur="indefinite" restart="never" nodeType="tmRoot"/>
       </p:par>
     </p:tnLst>
   </p:timing>
@@ -8073,6 +7983,102 @@
 </file>
 
 <file path=ppt/slides/slide5.xml><?xml version="1.0" encoding="utf-8"?>
+<p:sld xmlns:a="http://schemas.openxmlformats.org/drawingml/2006/main" xmlns:r="http://schemas.openxmlformats.org/officeDocument/2006/relationships" xmlns:p="http://schemas.openxmlformats.org/presentationml/2006/main">
+  <p:cSld>
+    <p:spTree>
+      <p:nvGrpSpPr>
+        <p:cNvPr id="1" name=""/>
+        <p:cNvGrpSpPr/>
+        <p:nvPr/>
+      </p:nvGrpSpPr>
+      <p:grpSpPr>
+        <a:xfrm>
+          <a:off x="0" y="0"/>
+          <a:ext cx="0" cy="0"/>
+          <a:chOff x="0" y="0"/>
+          <a:chExt cx="0" cy="0"/>
+        </a:xfrm>
+      </p:grpSpPr>
+      <p:sp>
+        <p:nvSpPr>
+          <p:cNvPr id="2" name="Title 1"/>
+          <p:cNvSpPr>
+            <a:spLocks noGrp="1"/>
+          </p:cNvSpPr>
+          <p:nvPr>
+            <p:ph type="title"/>
+          </p:nvPr>
+        </p:nvSpPr>
+        <p:spPr>
+          <a:xfrm>
+            <a:off x="3589266" y="220856"/>
+            <a:ext cx="8080450" cy="865014"/>
+          </a:xfrm>
+        </p:spPr>
+        <p:txBody>
+          <a:bodyPr>
+            <a:normAutofit fontScale="90000"/>
+          </a:bodyPr>
+          <a:lstStyle/>
+          <a:p>
+            <a:r>
+              <a:rPr lang="en-US" dirty="0" smtClean="0"/>
+              <a:t>Administrator Password reset</a:t>
+            </a:r>
+            <a:endParaRPr lang="en-US" dirty="0"/>
+          </a:p>
+        </p:txBody>
+      </p:sp>
+      <p:pic>
+        <p:nvPicPr>
+          <p:cNvPr id="4" name="Content Placeholder 3"/>
+          <p:cNvPicPr>
+            <a:picLocks noGrp="1" noChangeAspect="1"/>
+          </p:cNvPicPr>
+          <p:nvPr>
+            <p:ph idx="1"/>
+          </p:nvPr>
+        </p:nvPicPr>
+        <p:blipFill>
+          <a:blip r:embed="rId2"/>
+          <a:srcRect l="-34024" r="-34024"/>
+          <a:stretch>
+            <a:fillRect/>
+          </a:stretch>
+        </p:blipFill>
+        <p:spPr>
+          <a:xfrm>
+            <a:off x="-374285" y="1233105"/>
+            <a:ext cx="12664755" cy="5337323"/>
+          </a:xfrm>
+        </p:spPr>
+      </p:pic>
+    </p:spTree>
+    <p:extLst>
+      <p:ext uri="{BB962C8B-B14F-4D97-AF65-F5344CB8AC3E}">
+        <p14:creationId xmlns:p14="http://schemas.microsoft.com/office/powerpoint/2010/main" val="752597678"/>
+      </p:ext>
+    </p:extLst>
+  </p:cSld>
+  <p:clrMapOvr>
+    <a:masterClrMapping/>
+  </p:clrMapOvr>
+  <mc:AlternateContent xmlns:mc="http://schemas.openxmlformats.org/markup-compatibility/2006" xmlns:p14="http://schemas.microsoft.com/office/powerpoint/2010/main">
+    <mc:Choice Requires="p14">
+      <p:transition spd="slow">
+        <p14:reveal/>
+      </p:transition>
+    </mc:Choice>
+    <mc:Fallback xmlns="">
+      <p:transition spd="slow">
+        <p:fade/>
+      </p:transition>
+    </mc:Fallback>
+  </mc:AlternateContent>
+</p:sld>
+</file>
+
+<file path=ppt/slides/slide6.xml><?xml version="1.0" encoding="utf-8"?>
 <p:sld xmlns:a="http://schemas.openxmlformats.org/drawingml/2006/main" xmlns:r="http://schemas.openxmlformats.org/officeDocument/2006/relationships" xmlns:p="http://schemas.openxmlformats.org/presentationml/2006/main">
   <p:cSld>
     <p:spTree>
@@ -8174,106 +8180,10 @@
   <p:timing>
     <p:tnLst>
       <p:par>
-        <p:cTn xmlns:p14="http://schemas.microsoft.com/office/powerpoint/2010/main" id="1" dur="indefinite" restart="never" nodeType="tmRoot"/>
+        <p:cTn id="1" dur="indefinite" restart="never" nodeType="tmRoot"/>
       </p:par>
     </p:tnLst>
   </p:timing>
-</p:sld>
-</file>
-
-<file path=ppt/slides/slide6.xml><?xml version="1.0" encoding="utf-8"?>
-<p:sld xmlns:a="http://schemas.openxmlformats.org/drawingml/2006/main" xmlns:r="http://schemas.openxmlformats.org/officeDocument/2006/relationships" xmlns:p="http://schemas.openxmlformats.org/presentationml/2006/main">
-  <p:cSld>
-    <p:spTree>
-      <p:nvGrpSpPr>
-        <p:cNvPr id="1" name=""/>
-        <p:cNvGrpSpPr/>
-        <p:nvPr/>
-      </p:nvGrpSpPr>
-      <p:grpSpPr>
-        <a:xfrm>
-          <a:off x="0" y="0"/>
-          <a:ext cx="0" cy="0"/>
-          <a:chOff x="0" y="0"/>
-          <a:chExt cx="0" cy="0"/>
-        </a:xfrm>
-      </p:grpSpPr>
-      <p:sp>
-        <p:nvSpPr>
-          <p:cNvPr id="2" name="Title 1"/>
-          <p:cNvSpPr>
-            <a:spLocks noGrp="1"/>
-          </p:cNvSpPr>
-          <p:nvPr>
-            <p:ph type="title"/>
-          </p:nvPr>
-        </p:nvSpPr>
-        <p:spPr>
-          <a:xfrm>
-            <a:off x="3589266" y="220856"/>
-            <a:ext cx="8080450" cy="865014"/>
-          </a:xfrm>
-        </p:spPr>
-        <p:txBody>
-          <a:bodyPr>
-            <a:normAutofit fontScale="90000"/>
-          </a:bodyPr>
-          <a:lstStyle/>
-          <a:p>
-            <a:r>
-              <a:rPr lang="en-US" dirty="0" smtClean="0"/>
-              <a:t>Administrator Password reset</a:t>
-            </a:r>
-            <a:endParaRPr lang="en-US" dirty="0"/>
-          </a:p>
-        </p:txBody>
-      </p:sp>
-      <p:pic>
-        <p:nvPicPr>
-          <p:cNvPr id="4" name="Content Placeholder 3"/>
-          <p:cNvPicPr>
-            <a:picLocks noGrp="1" noChangeAspect="1"/>
-          </p:cNvPicPr>
-          <p:nvPr>
-            <p:ph idx="1"/>
-          </p:nvPr>
-        </p:nvPicPr>
-        <p:blipFill>
-          <a:blip r:embed="rId2"/>
-          <a:srcRect l="-34024" r="-34024"/>
-          <a:stretch>
-            <a:fillRect/>
-          </a:stretch>
-        </p:blipFill>
-        <p:spPr>
-          <a:xfrm>
-            <a:off x="-374285" y="1233105"/>
-            <a:ext cx="12664755" cy="5337323"/>
-          </a:xfrm>
-        </p:spPr>
-      </p:pic>
-    </p:spTree>
-    <p:extLst>
-      <p:ext uri="{BB962C8B-B14F-4D97-AF65-F5344CB8AC3E}">
-        <p14:creationId xmlns:p14="http://schemas.microsoft.com/office/powerpoint/2010/main" val="752597678"/>
-      </p:ext>
-    </p:extLst>
-  </p:cSld>
-  <p:clrMapOvr>
-    <a:masterClrMapping/>
-  </p:clrMapOvr>
-  <mc:AlternateContent xmlns:mc="http://schemas.openxmlformats.org/markup-compatibility/2006" xmlns:p14="http://schemas.microsoft.com/office/powerpoint/2010/main">
-    <mc:Choice Requires="p14">
-      <p:transition spd="slow">
-        <p14:reveal/>
-      </p:transition>
-    </mc:Choice>
-    <mc:Fallback xmlns="">
-      <p:transition spd="slow">
-        <p:fade/>
-      </p:transition>
-    </mc:Fallback>
-  </mc:AlternateContent>
 </p:sld>
 </file>
 
@@ -8430,7 +8340,7 @@
       </p:sp>
       <p:pic>
         <p:nvPicPr>
-          <p:cNvPr id="4" name="Content Placeholder 3"/>
+          <p:cNvPr id="5" name="Content Placeholder 4"/>
           <p:cNvPicPr>
             <a:picLocks noGrp="1" noChangeAspect="1"/>
           </p:cNvPicPr>
@@ -8439,16 +8349,21 @@
           </p:nvPr>
         </p:nvPicPr>
         <p:blipFill>
-          <a:blip r:embed="rId2"/>
-          <a:srcRect l="-18423" r="-18423"/>
+          <a:blip r:embed="rId2">
+            <a:extLst>
+              <a:ext uri="{28A0092B-C50C-407E-A947-70E740481C1C}">
+                <a14:useLocalDpi xmlns:a14="http://schemas.microsoft.com/office/drawing/2010/main" val="0"/>
+              </a:ext>
+            </a:extLst>
+          </a:blip>
           <a:stretch>
             <a:fillRect/>
           </a:stretch>
         </p:blipFill>
         <p:spPr>
           <a:xfrm>
-            <a:off x="220877" y="1180025"/>
-            <a:ext cx="11724256" cy="5354661"/>
+            <a:off x="1543665" y="1360872"/>
+            <a:ext cx="8583028" cy="5364393"/>
           </a:xfrm>
         </p:spPr>
       </p:pic>
@@ -8835,7 +8750,7 @@
   <a:extraClrSchemeLst/>
   <a:extLst>
     <a:ext uri="{05A4C25C-085E-4340-85A3-A5531E510DB2}">
-      <thm15:themeFamily xmlns:thm15="http://schemas.microsoft.com/office/thememl/2012/main" xmlns="" name="Vapor Trail" id="{4FDF2955-7D9C-493C-B9F9-C205151B46CD}" vid="{8F31A783-2159-4870-BC29-2BA7D038EA44}"/>
+      <thm15:themeFamily xmlns:thm15="http://schemas.microsoft.com/office/thememl/2012/main" name="Vapor Trail" id="{4FDF2955-7D9C-493C-B9F9-C205151B46CD}" vid="{8F31A783-2159-4870-BC29-2BA7D038EA44}"/>
     </a:ext>
   </a:extLst>
 </a:theme>

</xml_diff>

<commit_message>
Fix teacher worksheet history mockups to include answer key buttons
Also updated the powerpoint with the fixed mockups
</commit_message>
<xml_diff>
--- a/documents/User_Interface_Prototype_Project_PhaseII_Elementary Engineers.pptx
+++ b/documents/User_Interface_Prototype_Project_PhaseII_Elementary Engineers.pptx
@@ -6154,6 +6154,13 @@
       </p:transition>
     </mc:Fallback>
   </mc:AlternateContent>
+  <p:timing>
+    <p:tnLst>
+      <p:par>
+        <p:cTn id="1" dur="indefinite" restart="never" nodeType="tmRoot"/>
+      </p:par>
+    </p:tnLst>
+  </p:timing>
 </p:sld>
 </file>
 
@@ -6248,6 +6255,13 @@
       </p:transition>
     </mc:Fallback>
   </mc:AlternateContent>
+  <p:timing>
+    <p:tnLst>
+      <p:par>
+        <p:cTn id="1" dur="indefinite" restart="never" nodeType="tmRoot"/>
+      </p:par>
+    </p:tnLst>
+  </p:timing>
 </p:sld>
 </file>
 
@@ -6290,7 +6304,11 @@
           <a:p>
             <a:r>
               <a:rPr lang="en-US" dirty="0" smtClean="0"/>
-              <a:t>Teacher – Worksheet </a:t>
+              <a:t>Teacher – </a:t>
+            </a:r>
+            <a:r>
+              <a:rPr lang="en-US" dirty="0" smtClean="0"/>
+              <a:t>Worksheet </a:t>
             </a:r>
             <a:r>
               <a:rPr lang="en-US" dirty="0" err="1" smtClean="0"/>
@@ -6302,7 +6320,7 @@
       </p:sp>
       <p:pic>
         <p:nvPicPr>
-          <p:cNvPr id="4" name="Content Placeholder 3"/>
+          <p:cNvPr id="5" name="Content Placeholder 4"/>
           <p:cNvPicPr>
             <a:picLocks noGrp="1" noChangeAspect="1"/>
           </p:cNvPicPr>
@@ -6311,16 +6329,21 @@
           </p:nvPr>
         </p:nvPicPr>
         <p:blipFill>
-          <a:blip r:embed="rId2"/>
-          <a:srcRect l="-22647" r="-22647"/>
+          <a:blip r:embed="rId2">
+            <a:extLst>
+              <a:ext uri="{28A0092B-C50C-407E-A947-70E740481C1C}">
+                <a14:useLocalDpi xmlns:a14="http://schemas.microsoft.com/office/drawing/2010/main" val="0"/>
+              </a:ext>
+            </a:extLst>
+          </a:blip>
           <a:stretch>
             <a:fillRect/>
           </a:stretch>
         </p:blipFill>
         <p:spPr>
           <a:xfrm>
-            <a:off x="312909" y="1403284"/>
-            <a:ext cx="12111217" cy="5093526"/>
+            <a:off x="1521501" y="1347019"/>
+            <a:ext cx="8556564" cy="5347853"/>
           </a:xfrm>
         </p:spPr>
       </p:pic>
@@ -6346,6 +6369,13 @@
       </p:transition>
     </mc:Fallback>
   </mc:AlternateContent>
+  <p:timing>
+    <p:tnLst>
+      <p:par>
+        <p:cTn id="1" dur="indefinite" restart="never" nodeType="tmRoot"/>
+      </p:par>
+    </p:tnLst>
+  </p:timing>
 </p:sld>
 </file>
 
@@ -6440,6 +6470,13 @@
       </p:transition>
     </mc:Fallback>
   </mc:AlternateContent>
+  <p:timing>
+    <p:tnLst>
+      <p:par>
+        <p:cTn id="1" dur="indefinite" restart="never" nodeType="tmRoot"/>
+      </p:par>
+    </p:tnLst>
+  </p:timing>
 </p:sld>
 </file>
 
@@ -6534,6 +6571,13 @@
       </p:transition>
     </mc:Fallback>
   </mc:AlternateContent>
+  <p:timing>
+    <p:tnLst>
+      <p:par>
+        <p:cTn id="1" dur="indefinite" restart="never" nodeType="tmRoot"/>
+      </p:par>
+    </p:tnLst>
+  </p:timing>
 </p:sld>
 </file>
 
@@ -6628,6 +6672,13 @@
       </p:transition>
     </mc:Fallback>
   </mc:AlternateContent>
+  <p:timing>
+    <p:tnLst>
+      <p:par>
+        <p:cTn id="1" dur="indefinite" restart="never" nodeType="tmRoot"/>
+      </p:par>
+    </p:tnLst>
+  </p:timing>
 </p:sld>
 </file>
 
@@ -6722,6 +6773,13 @@
       </p:transition>
     </mc:Fallback>
   </mc:AlternateContent>
+  <p:timing>
+    <p:tnLst>
+      <p:par>
+        <p:cTn id="1" dur="indefinite" restart="never" nodeType="tmRoot"/>
+      </p:par>
+    </p:tnLst>
+  </p:timing>
 </p:sld>
 </file>
 
@@ -6816,6 +6874,13 @@
       </p:transition>
     </mc:Fallback>
   </mc:AlternateContent>
+  <p:timing>
+    <p:tnLst>
+      <p:par>
+        <p:cTn id="1" dur="indefinite" restart="never" nodeType="tmRoot"/>
+      </p:par>
+    </p:tnLst>
+  </p:timing>
 </p:sld>
 </file>
 
@@ -6910,6 +6975,13 @@
       </p:transition>
     </mc:Fallback>
   </mc:AlternateContent>
+  <p:timing>
+    <p:tnLst>
+      <p:par>
+        <p:cTn id="1" dur="indefinite" restart="never" nodeType="tmRoot"/>
+      </p:par>
+    </p:tnLst>
+  </p:timing>
 </p:sld>
 </file>
 
@@ -6962,7 +7034,7 @@
       </p:sp>
       <p:pic>
         <p:nvPicPr>
-          <p:cNvPr id="4" name="Content Placeholder 3"/>
+          <p:cNvPr id="5" name="Content Placeholder 4"/>
           <p:cNvPicPr>
             <a:picLocks noGrp="1" noChangeAspect="1"/>
           </p:cNvPicPr>
@@ -6971,16 +7043,21 @@
           </p:nvPr>
         </p:nvPicPr>
         <p:blipFill>
-          <a:blip r:embed="rId2"/>
-          <a:srcRect l="-19246" r="-19246"/>
+          <a:blip r:embed="rId2">
+            <a:extLst>
+              <a:ext uri="{28A0092B-C50C-407E-A947-70E740481C1C}">
+                <a14:useLocalDpi xmlns:a14="http://schemas.microsoft.com/office/drawing/2010/main" val="0"/>
+              </a:ext>
+            </a:extLst>
+          </a:blip>
           <a:stretch>
             <a:fillRect/>
           </a:stretch>
         </p:blipFill>
         <p:spPr>
           <a:xfrm>
-            <a:off x="222989" y="1401029"/>
-            <a:ext cx="11649717" cy="5257413"/>
+            <a:off x="1521501" y="1347019"/>
+            <a:ext cx="8517234" cy="5323272"/>
           </a:xfrm>
         </p:spPr>
       </p:pic>
@@ -7006,6 +7083,13 @@
       </p:transition>
     </mc:Fallback>
   </mc:AlternateContent>
+  <p:timing>
+    <p:tnLst>
+      <p:par>
+        <p:cTn id="1" dur="indefinite" restart="never" nodeType="tmRoot"/>
+      </p:par>
+    </p:tnLst>
+  </p:timing>
 </p:sld>
 </file>
 
@@ -7108,6 +7192,13 @@
       </p:transition>
     </mc:Fallback>
   </mc:AlternateContent>
+  <p:timing>
+    <p:tnLst>
+      <p:par>
+        <p:cTn id="1" dur="indefinite" restart="never" nodeType="tmRoot"/>
+      </p:par>
+    </p:tnLst>
+  </p:timing>
 </p:sld>
 </file>
 
@@ -7204,6 +7295,13 @@
       </p:transition>
     </mc:Fallback>
   </mc:AlternateContent>
+  <p:timing>
+    <p:tnLst>
+      <p:par>
+        <p:cTn id="1" dur="indefinite" restart="never" nodeType="tmRoot"/>
+      </p:par>
+    </p:tnLst>
+  </p:timing>
 </p:sld>
 </file>
 
@@ -7298,6 +7396,13 @@
       </p:transition>
     </mc:Fallback>
   </mc:AlternateContent>
+  <p:timing>
+    <p:tnLst>
+      <p:par>
+        <p:cTn id="1" dur="indefinite" restart="never" nodeType="tmRoot"/>
+      </p:par>
+    </p:tnLst>
+  </p:timing>
 </p:sld>
 </file>
 
@@ -7392,6 +7497,13 @@
       </p:transition>
     </mc:Fallback>
   </mc:AlternateContent>
+  <p:timing>
+    <p:tnLst>
+      <p:par>
+        <p:cTn id="1" dur="indefinite" restart="never" nodeType="tmRoot"/>
+      </p:par>
+    </p:tnLst>
+  </p:timing>
 </p:sld>
 </file>
 
@@ -7486,6 +7598,13 @@
       </p:transition>
     </mc:Fallback>
   </mc:AlternateContent>
+  <p:timing>
+    <p:tnLst>
+      <p:par>
+        <p:cTn id="1" dur="indefinite" restart="never" nodeType="tmRoot"/>
+      </p:par>
+    </p:tnLst>
+  </p:timing>
 </p:sld>
 </file>
 
@@ -7580,6 +7699,13 @@
       </p:transition>
     </mc:Fallback>
   </mc:AlternateContent>
+  <p:timing>
+    <p:tnLst>
+      <p:par>
+        <p:cTn id="1" dur="indefinite" restart="never" nodeType="tmRoot"/>
+      </p:par>
+    </p:tnLst>
+  </p:timing>
 </p:sld>
 </file>
 
@@ -7674,6 +7800,13 @@
       </p:transition>
     </mc:Fallback>
   </mc:AlternateContent>
+  <p:timing>
+    <p:tnLst>
+      <p:par>
+        <p:cTn id="1" dur="indefinite" restart="never" nodeType="tmRoot"/>
+      </p:par>
+    </p:tnLst>
+  </p:timing>
 </p:sld>
 </file>
 
@@ -7777,6 +7910,13 @@
       </p:transition>
     </mc:Fallback>
   </mc:AlternateContent>
+  <p:timing>
+    <p:tnLst>
+      <p:par>
+        <p:cTn id="1" dur="indefinite" restart="never" nodeType="tmRoot"/>
+      </p:par>
+    </p:tnLst>
+  </p:timing>
 </p:sld>
 </file>
 
@@ -8075,6 +8215,13 @@
       </p:transition>
     </mc:Fallback>
   </mc:AlternateContent>
+  <p:timing>
+    <p:tnLst>
+      <p:par>
+        <p:cTn id="1" dur="indefinite" restart="never" nodeType="tmRoot"/>
+      </p:par>
+    </p:tnLst>
+  </p:timing>
 </p:sld>
 </file>
 
@@ -8284,6 +8431,13 @@
       </p:transition>
     </mc:Fallback>
   </mc:AlternateContent>
+  <p:timing>
+    <p:tnLst>
+      <p:par>
+        <p:cTn id="1" dur="indefinite" restart="never" nodeType="tmRoot"/>
+      </p:par>
+    </p:tnLst>
+  </p:timing>
 </p:sld>
 </file>
 
@@ -8389,6 +8543,13 @@
       </p:transition>
     </mc:Fallback>
   </mc:AlternateContent>
+  <p:timing>
+    <p:tnLst>
+      <p:par>
+        <p:cTn id="1" dur="indefinite" restart="never" nodeType="tmRoot"/>
+      </p:par>
+    </p:tnLst>
+  </p:timing>
 </p:sld>
 </file>
 
@@ -8483,6 +8644,13 @@
       </p:transition>
     </mc:Fallback>
   </mc:AlternateContent>
+  <p:timing>
+    <p:tnLst>
+      <p:par>
+        <p:cTn id="1" dur="indefinite" restart="never" nodeType="tmRoot"/>
+      </p:par>
+    </p:tnLst>
+  </p:timing>
 </p:sld>
 </file>
 

</xml_diff>

<commit_message>
Add My Account prototype to Powerpoint presentation
</commit_message>
<xml_diff>
--- a/documents/User_Interface_Prototype_Project_PhaseII_Elementary Engineers.pptx
+++ b/documents/User_Interface_Prototype_Project_PhaseII_Elementary Engineers.pptx
@@ -30,7 +30,8 @@
     <p:sldId id="291" r:id="rId24"/>
     <p:sldId id="289" r:id="rId25"/>
     <p:sldId id="292" r:id="rId26"/>
-    <p:sldId id="293" r:id="rId27"/>
+    <p:sldId id="294" r:id="rId27"/>
+    <p:sldId id="293" r:id="rId28"/>
   </p:sldIdLst>
   <p:sldSz cx="12192000" cy="6858000"/>
   <p:notesSz cx="6858000" cy="9144000"/>
@@ -6304,11 +6305,7 @@
           <a:p>
             <a:r>
               <a:rPr lang="en-US" dirty="0" smtClean="0"/>
-              <a:t>Teacher – </a:t>
-            </a:r>
-            <a:r>
-              <a:rPr lang="en-US" dirty="0" smtClean="0"/>
-              <a:t>Worksheet </a:t>
+              <a:t>Teacher – Worksheet </a:t>
             </a:r>
             <a:r>
               <a:rPr lang="en-US" dirty="0" err="1" smtClean="0"/>
@@ -7811,6 +7808,105 @@
 </file>
 
 <file path=ppt/slides/slide26.xml><?xml version="1.0" encoding="utf-8"?>
+<p:sld xmlns:a="http://schemas.openxmlformats.org/drawingml/2006/main" xmlns:r="http://schemas.openxmlformats.org/officeDocument/2006/relationships" xmlns:p="http://schemas.openxmlformats.org/presentationml/2006/main">
+  <p:cSld>
+    <p:spTree>
+      <p:nvGrpSpPr>
+        <p:cNvPr id="1" name=""/>
+        <p:cNvGrpSpPr/>
+        <p:nvPr/>
+      </p:nvGrpSpPr>
+      <p:grpSpPr>
+        <a:xfrm>
+          <a:off x="0" y="0"/>
+          <a:ext cx="0" cy="0"/>
+          <a:chOff x="0" y="0"/>
+          <a:chExt cx="0" cy="0"/>
+        </a:xfrm>
+      </p:grpSpPr>
+      <p:sp>
+        <p:nvSpPr>
+          <p:cNvPr id="2" name="Title 1"/>
+          <p:cNvSpPr>
+            <a:spLocks noGrp="1"/>
+          </p:cNvSpPr>
+          <p:nvPr>
+            <p:ph type="title"/>
+          </p:nvPr>
+        </p:nvSpPr>
+        <p:spPr>
+          <a:xfrm>
+            <a:off x="2915265" y="424263"/>
+            <a:ext cx="8610600" cy="1293028"/>
+          </a:xfrm>
+        </p:spPr>
+        <p:txBody>
+          <a:bodyPr/>
+          <a:lstStyle/>
+          <a:p>
+            <a:r>
+              <a:rPr lang="en-US" dirty="0" smtClean="0"/>
+              <a:t>My Account</a:t>
+            </a:r>
+            <a:endParaRPr lang="en-US" dirty="0"/>
+          </a:p>
+        </p:txBody>
+      </p:sp>
+      <p:pic>
+        <p:nvPicPr>
+          <p:cNvPr id="4" name="Content Placeholder 3"/>
+          <p:cNvPicPr>
+            <a:picLocks noGrp="1" noChangeAspect="1"/>
+          </p:cNvPicPr>
+          <p:nvPr>
+            <p:ph idx="1"/>
+          </p:nvPr>
+        </p:nvPicPr>
+        <p:blipFill>
+          <a:blip r:embed="rId2">
+            <a:extLst>
+              <a:ext uri="{28A0092B-C50C-407E-A947-70E740481C1C}">
+                <a14:useLocalDpi xmlns:a14="http://schemas.microsoft.com/office/drawing/2010/main" val="0"/>
+              </a:ext>
+            </a:extLst>
+          </a:blip>
+          <a:stretch>
+            <a:fillRect/>
+          </a:stretch>
+        </p:blipFill>
+        <p:spPr>
+          <a:xfrm>
+            <a:off x="1788938" y="1514169"/>
+            <a:ext cx="8306291" cy="5191432"/>
+          </a:xfrm>
+        </p:spPr>
+      </p:pic>
+    </p:spTree>
+    <p:extLst>
+      <p:ext uri="{BB962C8B-B14F-4D97-AF65-F5344CB8AC3E}">
+        <p14:creationId xmlns:p14="http://schemas.microsoft.com/office/powerpoint/2010/main" val="2036564000"/>
+      </p:ext>
+    </p:extLst>
+  </p:cSld>
+  <p:clrMapOvr>
+    <a:masterClrMapping/>
+  </p:clrMapOvr>
+  <mc:AlternateContent xmlns:mc="http://schemas.openxmlformats.org/markup-compatibility/2006" xmlns:p14="http://schemas.microsoft.com/office/powerpoint/2010/main">
+    <mc:Choice Requires="p14">
+      <p:transition spd="slow">
+        <p14:reveal/>
+      </p:transition>
+    </mc:Choice>
+    <mc:Fallback xmlns="">
+      <p:transition spd="slow">
+        <p:fade/>
+      </p:transition>
+    </mc:Fallback>
+  </mc:AlternateContent>
+</p:sld>
+</file>
+
+<file path=ppt/slides/slide27.xml><?xml version="1.0" encoding="utf-8"?>
 <p:sld xmlns:a="http://schemas.openxmlformats.org/drawingml/2006/main" xmlns:r="http://schemas.openxmlformats.org/officeDocument/2006/relationships" xmlns:p="http://schemas.openxmlformats.org/presentationml/2006/main">
   <p:cSld>
     <p:spTree>

</xml_diff>

<commit_message>
Add preliminary GUI code and minor fixes to presentation
</commit_message>
<xml_diff>
--- a/documents/User_Interface_Prototype_Project_PhaseII_Elementary Engineers.pptx
+++ b/documents/User_Interface_Prototype_Project_PhaseII_Elementary Engineers.pptx
@@ -16,22 +16,24 @@
     <p:sldId id="274" r:id="rId10"/>
     <p:sldId id="285" r:id="rId11"/>
     <p:sldId id="276" r:id="rId12"/>
-    <p:sldId id="277" r:id="rId13"/>
-    <p:sldId id="278" r:id="rId14"/>
-    <p:sldId id="279" r:id="rId15"/>
-    <p:sldId id="280" r:id="rId16"/>
-    <p:sldId id="288" r:id="rId17"/>
-    <p:sldId id="281" r:id="rId18"/>
-    <p:sldId id="282" r:id="rId19"/>
-    <p:sldId id="286" r:id="rId20"/>
-    <p:sldId id="275" r:id="rId21"/>
-    <p:sldId id="287" r:id="rId22"/>
-    <p:sldId id="290" r:id="rId23"/>
-    <p:sldId id="291" r:id="rId24"/>
-    <p:sldId id="289" r:id="rId25"/>
-    <p:sldId id="292" r:id="rId26"/>
-    <p:sldId id="294" r:id="rId27"/>
-    <p:sldId id="293" r:id="rId28"/>
+    <p:sldId id="297" r:id="rId13"/>
+    <p:sldId id="277" r:id="rId14"/>
+    <p:sldId id="278" r:id="rId15"/>
+    <p:sldId id="279" r:id="rId16"/>
+    <p:sldId id="280" r:id="rId17"/>
+    <p:sldId id="288" r:id="rId18"/>
+    <p:sldId id="281" r:id="rId19"/>
+    <p:sldId id="282" r:id="rId20"/>
+    <p:sldId id="286" r:id="rId21"/>
+    <p:sldId id="275" r:id="rId22"/>
+    <p:sldId id="287" r:id="rId23"/>
+    <p:sldId id="290" r:id="rId24"/>
+    <p:sldId id="291" r:id="rId25"/>
+    <p:sldId id="289" r:id="rId26"/>
+    <p:sldId id="292" r:id="rId27"/>
+    <p:sldId id="294" r:id="rId28"/>
+    <p:sldId id="293" r:id="rId29"/>
+    <p:sldId id="296" r:id="rId30"/>
   </p:sldIdLst>
   <p:sldSz cx="12192000" cy="6858000"/>
   <p:notesSz cx="6858000" cy="9144000"/>
@@ -319,7 +321,7 @@
           <a:p>
             <a:fld id="{48A87A34-81AB-432B-8DAE-1953F412C126}" type="datetimeFigureOut">
               <a:rPr lang="en-US" dirty="0"/>
-              <a:t>3/23/16</a:t>
+              <a:t>3/24/16</a:t>
             </a:fld>
             <a:endParaRPr lang="en-US" dirty="0"/>
           </a:p>
@@ -593,7 +595,7 @@
           <a:p>
             <a:fld id="{48A87A34-81AB-432B-8DAE-1953F412C126}" type="datetimeFigureOut">
               <a:rPr lang="en-US" dirty="0"/>
-              <a:t>3/23/16</a:t>
+              <a:t>3/24/16</a:t>
             </a:fld>
             <a:endParaRPr lang="en-US" dirty="0"/>
           </a:p>
@@ -832,7 +834,7 @@
             <a:fld id="{48A87A34-81AB-432B-8DAE-1953F412C126}" type="datetimeFigureOut">
               <a:rPr lang="en-US" dirty="0"/>
               <a:pPr/>
-              <a:t>3/23/16</a:t>
+              <a:t>3/24/16</a:t>
             </a:fld>
             <a:endParaRPr lang="en-US" dirty="0"/>
           </a:p>
@@ -1150,7 +1152,7 @@
             <a:fld id="{48A87A34-81AB-432B-8DAE-1953F412C126}" type="datetimeFigureOut">
               <a:rPr lang="en-US" dirty="0"/>
               <a:pPr/>
-              <a:t>3/23/16</a:t>
+              <a:t>3/24/16</a:t>
             </a:fld>
             <a:endParaRPr lang="en-US" dirty="0"/>
           </a:p>
@@ -1631,7 +1633,7 @@
             <a:fld id="{48A87A34-81AB-432B-8DAE-1953F412C126}" type="datetimeFigureOut">
               <a:rPr lang="en-US" dirty="0"/>
               <a:pPr/>
-              <a:t>3/23/16</a:t>
+              <a:t>3/24/16</a:t>
             </a:fld>
             <a:endParaRPr lang="en-US" dirty="0"/>
           </a:p>
@@ -2185,7 +2187,7 @@
           <a:p>
             <a:fld id="{48A87A34-81AB-432B-8DAE-1953F412C126}" type="datetimeFigureOut">
               <a:rPr lang="en-US" dirty="0"/>
-              <a:t>3/23/16</a:t>
+              <a:t>3/24/16</a:t>
             </a:fld>
             <a:endParaRPr lang="en-US" dirty="0"/>
           </a:p>
@@ -2966,7 +2968,7 @@
           <a:p>
             <a:fld id="{48A87A34-81AB-432B-8DAE-1953F412C126}" type="datetimeFigureOut">
               <a:rPr lang="en-US" dirty="0"/>
-              <a:t>3/23/16</a:t>
+              <a:t>3/24/16</a:t>
             </a:fld>
             <a:endParaRPr lang="en-US" dirty="0"/>
           </a:p>
@@ -3148,7 +3150,7 @@
           <a:p>
             <a:fld id="{48A87A34-81AB-432B-8DAE-1953F412C126}" type="datetimeFigureOut">
               <a:rPr lang="en-US" dirty="0"/>
-              <a:t>3/23/16</a:t>
+              <a:t>3/24/16</a:t>
             </a:fld>
             <a:endParaRPr lang="en-US" dirty="0"/>
           </a:p>
@@ -3379,7 +3381,7 @@
             <a:fld id="{48A87A34-81AB-432B-8DAE-1953F412C126}" type="datetimeFigureOut">
               <a:rPr lang="en-US" dirty="0"/>
               <a:pPr/>
-              <a:t>3/23/16</a:t>
+              <a:t>3/24/16</a:t>
             </a:fld>
             <a:endParaRPr lang="en-US" dirty="0"/>
           </a:p>
@@ -3566,7 +3568,7 @@
           <a:p>
             <a:fld id="{48A87A34-81AB-432B-8DAE-1953F412C126}" type="datetimeFigureOut">
               <a:rPr lang="en-US" dirty="0"/>
-              <a:t>3/23/16</a:t>
+              <a:t>3/24/16</a:t>
             </a:fld>
             <a:endParaRPr lang="en-US" dirty="0"/>
           </a:p>
@@ -3863,7 +3865,7 @@
             <a:fld id="{48A87A34-81AB-432B-8DAE-1953F412C126}" type="datetimeFigureOut">
               <a:rPr lang="en-US" dirty="0"/>
               <a:pPr/>
-              <a:t>3/23/16</a:t>
+              <a:t>3/24/16</a:t>
             </a:fld>
             <a:endParaRPr lang="en-US" dirty="0"/>
           </a:p>
@@ -4112,7 +4114,7 @@
           <a:p>
             <a:fld id="{48A87A34-81AB-432B-8DAE-1953F412C126}" type="datetimeFigureOut">
               <a:rPr lang="en-US" dirty="0"/>
-              <a:t>3/23/16</a:t>
+              <a:t>3/24/16</a:t>
             </a:fld>
             <a:endParaRPr lang="en-US" dirty="0"/>
           </a:p>
@@ -4498,7 +4500,7 @@
           <a:p>
             <a:fld id="{48A87A34-81AB-432B-8DAE-1953F412C126}" type="datetimeFigureOut">
               <a:rPr lang="en-US" dirty="0"/>
-              <a:t>3/23/16</a:t>
+              <a:t>3/24/16</a:t>
             </a:fld>
             <a:endParaRPr lang="en-US" dirty="0"/>
           </a:p>
@@ -4623,7 +4625,7 @@
           <a:p>
             <a:fld id="{48A87A34-81AB-432B-8DAE-1953F412C126}" type="datetimeFigureOut">
               <a:rPr lang="en-US" dirty="0"/>
-              <a:t>3/23/16</a:t>
+              <a:t>3/24/16</a:t>
             </a:fld>
             <a:endParaRPr lang="en-US" dirty="0"/>
           </a:p>
@@ -4725,7 +4727,7 @@
           <a:p>
             <a:fld id="{48A87A34-81AB-432B-8DAE-1953F412C126}" type="datetimeFigureOut">
               <a:rPr lang="en-US" dirty="0"/>
-              <a:t>3/23/16</a:t>
+              <a:t>3/24/16</a:t>
             </a:fld>
             <a:endParaRPr lang="en-US" dirty="0"/>
           </a:p>
@@ -4981,7 +4983,7 @@
           <a:p>
             <a:fld id="{48A87A34-81AB-432B-8DAE-1953F412C126}" type="datetimeFigureOut">
               <a:rPr lang="en-US" dirty="0"/>
-              <a:t>3/23/16</a:t>
+              <a:t>3/24/16</a:t>
             </a:fld>
             <a:endParaRPr lang="en-US" dirty="0"/>
           </a:p>
@@ -5245,7 +5247,7 @@
           <a:p>
             <a:fld id="{48A87A34-81AB-432B-8DAE-1953F412C126}" type="datetimeFigureOut">
               <a:rPr lang="en-US" dirty="0"/>
-              <a:t>3/23/16</a:t>
+              <a:t>3/24/16</a:t>
             </a:fld>
             <a:endParaRPr lang="en-US" dirty="0"/>
           </a:p>
@@ -5496,7 +5498,7 @@
             <a:fld id="{48A87A34-81AB-432B-8DAE-1953F412C126}" type="datetimeFigureOut">
               <a:rPr lang="en-US" dirty="0"/>
               <a:pPr/>
-              <a:t>3/23/16</a:t>
+              <a:t>3/24/16</a:t>
             </a:fld>
             <a:endParaRPr lang="en-US" dirty="0"/>
           </a:p>
@@ -6295,8 +6297,8 @@
         </p:nvSpPr>
         <p:spPr>
           <a:xfrm>
-            <a:off x="2895600" y="322665"/>
-            <a:ext cx="8610600" cy="928846"/>
+            <a:off x="2590800" y="0"/>
+            <a:ext cx="8610600" cy="1293028"/>
           </a:xfrm>
         </p:spPr>
         <p:txBody>
@@ -6305,11 +6307,7 @@
           <a:p>
             <a:r>
               <a:rPr lang="en-US" dirty="0" smtClean="0"/>
-              <a:t>Teacher – Worksheet </a:t>
-            </a:r>
-            <a:r>
-              <a:rPr lang="en-US" dirty="0" err="1" smtClean="0"/>
-              <a:t>HIstory</a:t>
+              <a:t>Example Worksheet</a:t>
             </a:r>
             <a:endParaRPr lang="en-US" dirty="0"/>
           </a:p>
@@ -6317,7 +6315,7 @@
       </p:sp>
       <p:pic>
         <p:nvPicPr>
-          <p:cNvPr id="5" name="Content Placeholder 4"/>
+          <p:cNvPr id="4" name="Content Placeholder 3"/>
           <p:cNvPicPr>
             <a:picLocks noGrp="1" noChangeAspect="1"/>
           </p:cNvPicPr>
@@ -6339,15 +6337,15 @@
         </p:blipFill>
         <p:spPr>
           <a:xfrm>
-            <a:off x="1521501" y="1347019"/>
-            <a:ext cx="8556564" cy="5347853"/>
+            <a:off x="3508067" y="1002890"/>
+            <a:ext cx="4613377" cy="5710169"/>
           </a:xfrm>
         </p:spPr>
       </p:pic>
     </p:spTree>
     <p:extLst>
       <p:ext uri="{BB962C8B-B14F-4D97-AF65-F5344CB8AC3E}">
-        <p14:creationId xmlns:p14="http://schemas.microsoft.com/office/powerpoint/2010/main" val="2295249284"/>
+        <p14:creationId xmlns:p14="http://schemas.microsoft.com/office/powerpoint/2010/main" val="369695777"/>
       </p:ext>
     </p:extLst>
   </p:cSld>
@@ -6366,13 +6364,6 @@
       </p:transition>
     </mc:Fallback>
   </mc:AlternateContent>
-  <p:timing>
-    <p:tnLst>
-      <p:par>
-        <p:cTn id="1" dur="indefinite" restart="never" nodeType="tmRoot"/>
-      </p:par>
-    </p:tnLst>
-  </p:timing>
 </p:sld>
 </file>
 
@@ -6405,8 +6396,8 @@
         </p:nvSpPr>
         <p:spPr>
           <a:xfrm>
-            <a:off x="2895600" y="267450"/>
-            <a:ext cx="8610600" cy="855228"/>
+            <a:off x="2895600" y="322665"/>
+            <a:ext cx="8610600" cy="928846"/>
           </a:xfrm>
         </p:spPr>
         <p:txBody>
@@ -6415,7 +6406,11 @@
           <a:p>
             <a:r>
               <a:rPr lang="en-US" dirty="0" smtClean="0"/>
-              <a:t>Teacher - Classes</a:t>
+              <a:t>Teacher – Worksheet </a:t>
+            </a:r>
+            <a:r>
+              <a:rPr lang="en-US" dirty="0" err="1" smtClean="0"/>
+              <a:t>HIstory</a:t>
             </a:r>
             <a:endParaRPr lang="en-US" dirty="0"/>
           </a:p>
@@ -6423,7 +6418,7 @@
       </p:sp>
       <p:pic>
         <p:nvPicPr>
-          <p:cNvPr id="4" name="Content Placeholder 3"/>
+          <p:cNvPr id="5" name="Content Placeholder 4"/>
           <p:cNvPicPr>
             <a:picLocks noGrp="1" noChangeAspect="1"/>
           </p:cNvPicPr>
@@ -6432,23 +6427,28 @@
           </p:nvPr>
         </p:nvPicPr>
         <p:blipFill>
-          <a:blip r:embed="rId2"/>
-          <a:srcRect l="-19359" r="-19359"/>
+          <a:blip r:embed="rId2">
+            <a:extLst>
+              <a:ext uri="{28A0092B-C50C-407E-A947-70E740481C1C}">
+                <a14:useLocalDpi xmlns:a14="http://schemas.microsoft.com/office/drawing/2010/main" val="0"/>
+              </a:ext>
+            </a:extLst>
+          </a:blip>
           <a:stretch>
             <a:fillRect/>
           </a:stretch>
         </p:blipFill>
         <p:spPr>
           <a:xfrm>
-            <a:off x="0" y="1343025"/>
-            <a:ext cx="11743342" cy="5184205"/>
+            <a:off x="1521501" y="1347019"/>
+            <a:ext cx="8556564" cy="5347853"/>
           </a:xfrm>
         </p:spPr>
       </p:pic>
     </p:spTree>
     <p:extLst>
       <p:ext uri="{BB962C8B-B14F-4D97-AF65-F5344CB8AC3E}">
-        <p14:creationId xmlns:p14="http://schemas.microsoft.com/office/powerpoint/2010/main" val="386809513"/>
+        <p14:creationId xmlns:p14="http://schemas.microsoft.com/office/powerpoint/2010/main" val="2295249284"/>
       </p:ext>
     </p:extLst>
   </p:cSld>
@@ -6506,8 +6506,8 @@
         </p:nvSpPr>
         <p:spPr>
           <a:xfrm>
-            <a:off x="2895600" y="396281"/>
-            <a:ext cx="8610600" cy="984061"/>
+            <a:off x="2895600" y="267450"/>
+            <a:ext cx="8610600" cy="855228"/>
           </a:xfrm>
         </p:spPr>
         <p:txBody>
@@ -6516,7 +6516,7 @@
           <a:p>
             <a:r>
               <a:rPr lang="en-US" dirty="0" smtClean="0"/>
-              <a:t>Teacher – Adding a New Class</a:t>
+              <a:t>Teacher - Classes</a:t>
             </a:r>
             <a:endParaRPr lang="en-US" dirty="0"/>
           </a:p>
@@ -6534,22 +6534,22 @@
         </p:nvPicPr>
         <p:blipFill>
           <a:blip r:embed="rId2"/>
-          <a:srcRect l="-21285" r="-21285"/>
+          <a:srcRect l="-19359" r="-19359"/>
           <a:stretch>
             <a:fillRect/>
           </a:stretch>
         </p:blipFill>
         <p:spPr>
           <a:xfrm>
-            <a:off x="296535" y="1380341"/>
-            <a:ext cx="11587335" cy="5079659"/>
+            <a:off x="0" y="1343025"/>
+            <a:ext cx="11743342" cy="5184205"/>
           </a:xfrm>
         </p:spPr>
       </p:pic>
     </p:spTree>
     <p:extLst>
       <p:ext uri="{BB962C8B-B14F-4D97-AF65-F5344CB8AC3E}">
-        <p14:creationId xmlns:p14="http://schemas.microsoft.com/office/powerpoint/2010/main" val="3397336195"/>
+        <p14:creationId xmlns:p14="http://schemas.microsoft.com/office/powerpoint/2010/main" val="386809513"/>
       </p:ext>
     </p:extLst>
   </p:cSld>
@@ -6607,8 +6607,8 @@
         </p:nvSpPr>
         <p:spPr>
           <a:xfrm>
-            <a:off x="2895600" y="285854"/>
-            <a:ext cx="8610600" cy="1293028"/>
+            <a:off x="2895600" y="396281"/>
+            <a:ext cx="8610600" cy="984061"/>
           </a:xfrm>
         </p:spPr>
         <p:txBody>
@@ -6617,7 +6617,7 @@
           <a:p>
             <a:r>
               <a:rPr lang="en-US" dirty="0" smtClean="0"/>
-              <a:t>Teacher  - Edit Class</a:t>
+              <a:t>Teacher – Adding a New Class</a:t>
             </a:r>
             <a:endParaRPr lang="en-US" dirty="0"/>
           </a:p>
@@ -6635,22 +6635,22 @@
         </p:nvPicPr>
         <p:blipFill>
           <a:blip r:embed="rId2"/>
-          <a:srcRect l="-24817" r="-24817"/>
+          <a:srcRect l="-21285" r="-21285"/>
           <a:stretch>
             <a:fillRect/>
           </a:stretch>
         </p:blipFill>
         <p:spPr>
           <a:xfrm>
-            <a:off x="91264" y="1578882"/>
-            <a:ext cx="11994465" cy="5009951"/>
+            <a:off x="296535" y="1380341"/>
+            <a:ext cx="11587335" cy="5079659"/>
           </a:xfrm>
         </p:spPr>
       </p:pic>
     </p:spTree>
     <p:extLst>
       <p:ext uri="{BB962C8B-B14F-4D97-AF65-F5344CB8AC3E}">
-        <p14:creationId xmlns:p14="http://schemas.microsoft.com/office/powerpoint/2010/main" val="1567482601"/>
+        <p14:creationId xmlns:p14="http://schemas.microsoft.com/office/powerpoint/2010/main" val="3397336195"/>
       </p:ext>
     </p:extLst>
   </p:cSld>
@@ -6708,8 +6708,8 @@
         </p:nvSpPr>
         <p:spPr>
           <a:xfrm>
-            <a:off x="2895600" y="322036"/>
-            <a:ext cx="8610600" cy="862284"/>
+            <a:off x="2895600" y="285854"/>
+            <a:ext cx="8610600" cy="1293028"/>
           </a:xfrm>
         </p:spPr>
         <p:txBody>
@@ -6718,7 +6718,7 @@
           <a:p>
             <a:r>
               <a:rPr lang="en-US" dirty="0" smtClean="0"/>
-              <a:t>Student registration</a:t>
+              <a:t>Teacher  - Edit Class</a:t>
             </a:r>
             <a:endParaRPr lang="en-US" dirty="0"/>
           </a:p>
@@ -6736,22 +6736,22 @@
         </p:nvPicPr>
         <p:blipFill>
           <a:blip r:embed="rId2"/>
-          <a:srcRect l="-22647" r="-22647"/>
+          <a:srcRect l="-24817" r="-24817"/>
           <a:stretch>
             <a:fillRect/>
           </a:stretch>
         </p:blipFill>
         <p:spPr>
           <a:xfrm>
-            <a:off x="221655" y="1524000"/>
-            <a:ext cx="11579701" cy="4981174"/>
+            <a:off x="91264" y="1578882"/>
+            <a:ext cx="11994465" cy="5009951"/>
           </a:xfrm>
         </p:spPr>
       </p:pic>
     </p:spTree>
     <p:extLst>
       <p:ext uri="{BB962C8B-B14F-4D97-AF65-F5344CB8AC3E}">
-        <p14:creationId xmlns:p14="http://schemas.microsoft.com/office/powerpoint/2010/main" val="3619587140"/>
+        <p14:creationId xmlns:p14="http://schemas.microsoft.com/office/powerpoint/2010/main" val="1567482601"/>
       </p:ext>
     </p:extLst>
   </p:cSld>
@@ -6809,8 +6809,8 @@
         </p:nvSpPr>
         <p:spPr>
           <a:xfrm>
-            <a:off x="2895600" y="267450"/>
-            <a:ext cx="8610600" cy="1039274"/>
+            <a:off x="2895600" y="322036"/>
+            <a:ext cx="8610600" cy="862284"/>
           </a:xfrm>
         </p:spPr>
         <p:txBody>
@@ -6819,7 +6819,7 @@
           <a:p>
             <a:r>
               <a:rPr lang="en-US" dirty="0" smtClean="0"/>
-              <a:t>Teacher – class roster</a:t>
+              <a:t>Student registration</a:t>
             </a:r>
             <a:endParaRPr lang="en-US" dirty="0"/>
           </a:p>
@@ -6837,22 +6837,22 @@
         </p:nvPicPr>
         <p:blipFill>
           <a:blip r:embed="rId2"/>
-          <a:srcRect l="-21573" r="-21573"/>
+          <a:srcRect l="-22647" r="-22647"/>
           <a:stretch>
             <a:fillRect/>
           </a:stretch>
         </p:blipFill>
         <p:spPr>
           <a:xfrm>
-            <a:off x="-84525" y="1306724"/>
-            <a:ext cx="12276525" cy="5360173"/>
+            <a:off x="221655" y="1524000"/>
+            <a:ext cx="11579701" cy="4981174"/>
           </a:xfrm>
         </p:spPr>
       </p:pic>
     </p:spTree>
     <p:extLst>
       <p:ext uri="{BB962C8B-B14F-4D97-AF65-F5344CB8AC3E}">
-        <p14:creationId xmlns:p14="http://schemas.microsoft.com/office/powerpoint/2010/main" val="296758909"/>
+        <p14:creationId xmlns:p14="http://schemas.microsoft.com/office/powerpoint/2010/main" val="3619587140"/>
       </p:ext>
     </p:extLst>
   </p:cSld>
@@ -6910,8 +6910,8 @@
         </p:nvSpPr>
         <p:spPr>
           <a:xfrm>
-            <a:off x="2895600" y="377877"/>
-            <a:ext cx="8610600" cy="910442"/>
+            <a:off x="2895600" y="267450"/>
+            <a:ext cx="8610600" cy="1039274"/>
           </a:xfrm>
         </p:spPr>
         <p:txBody>
@@ -6920,7 +6920,7 @@
           <a:p>
             <a:r>
               <a:rPr lang="en-US" dirty="0" smtClean="0"/>
-              <a:t>Teacher – student profile</a:t>
+              <a:t>Teacher – class roster</a:t>
             </a:r>
             <a:endParaRPr lang="en-US" dirty="0"/>
           </a:p>
@@ -6938,22 +6938,22 @@
         </p:nvPicPr>
         <p:blipFill>
           <a:blip r:embed="rId2"/>
-          <a:srcRect l="-21814" r="-21814"/>
+          <a:srcRect l="-21573" r="-21573"/>
           <a:stretch>
             <a:fillRect/>
           </a:stretch>
         </p:blipFill>
         <p:spPr>
           <a:xfrm>
-            <a:off x="257691" y="1509713"/>
-            <a:ext cx="11248509" cy="4894818"/>
+            <a:off x="-84525" y="1306724"/>
+            <a:ext cx="12276525" cy="5360173"/>
           </a:xfrm>
         </p:spPr>
       </p:pic>
     </p:spTree>
     <p:extLst>
       <p:ext uri="{BB962C8B-B14F-4D97-AF65-F5344CB8AC3E}">
-        <p14:creationId xmlns:p14="http://schemas.microsoft.com/office/powerpoint/2010/main" val="1068767978"/>
+        <p14:creationId xmlns:p14="http://schemas.microsoft.com/office/powerpoint/2010/main" val="296758909"/>
       </p:ext>
     </p:extLst>
   </p:cSld>
@@ -7011,19 +7011,17 @@
         </p:nvSpPr>
         <p:spPr>
           <a:xfrm>
-            <a:off x="2140513" y="236423"/>
-            <a:ext cx="9365688" cy="947897"/>
-          </a:xfrm>
-        </p:spPr>
-        <p:txBody>
-          <a:bodyPr>
-            <a:normAutofit fontScale="90000"/>
-          </a:bodyPr>
+            <a:off x="2895600" y="377877"/>
+            <a:ext cx="8610600" cy="910442"/>
+          </a:xfrm>
+        </p:spPr>
+        <p:txBody>
+          <a:bodyPr/>
           <a:lstStyle/>
           <a:p>
             <a:r>
               <a:rPr lang="en-US" dirty="0" smtClean="0"/>
-              <a:t>Teacher – Student Worksheet history </a:t>
+              <a:t>Teacher – student profile</a:t>
             </a:r>
             <a:endParaRPr lang="en-US" dirty="0"/>
           </a:p>
@@ -7031,7 +7029,7 @@
       </p:sp>
       <p:pic>
         <p:nvPicPr>
-          <p:cNvPr id="5" name="Content Placeholder 4"/>
+          <p:cNvPr id="4" name="Content Placeholder 3"/>
           <p:cNvPicPr>
             <a:picLocks noGrp="1" noChangeAspect="1"/>
           </p:cNvPicPr>
@@ -7040,28 +7038,23 @@
           </p:nvPr>
         </p:nvPicPr>
         <p:blipFill>
-          <a:blip r:embed="rId2">
-            <a:extLst>
-              <a:ext uri="{28A0092B-C50C-407E-A947-70E740481C1C}">
-                <a14:useLocalDpi xmlns:a14="http://schemas.microsoft.com/office/drawing/2010/main" val="0"/>
-              </a:ext>
-            </a:extLst>
-          </a:blip>
+          <a:blip r:embed="rId2"/>
+          <a:srcRect l="-21814" r="-21814"/>
           <a:stretch>
             <a:fillRect/>
           </a:stretch>
         </p:blipFill>
         <p:spPr>
           <a:xfrm>
-            <a:off x="1521501" y="1347019"/>
-            <a:ext cx="8517234" cy="5323272"/>
+            <a:off x="257691" y="1509713"/>
+            <a:ext cx="11248509" cy="4894818"/>
           </a:xfrm>
         </p:spPr>
       </p:pic>
     </p:spTree>
     <p:extLst>
       <p:ext uri="{BB962C8B-B14F-4D97-AF65-F5344CB8AC3E}">
-        <p14:creationId xmlns:p14="http://schemas.microsoft.com/office/powerpoint/2010/main" val="726405238"/>
+        <p14:creationId xmlns:p14="http://schemas.microsoft.com/office/powerpoint/2010/main" val="1068767978"/>
       </p:ext>
     </p:extLst>
   </p:cSld>
@@ -7228,8 +7221,8 @@
         </p:nvSpPr>
         <p:spPr>
           <a:xfrm>
-            <a:off x="3024445" y="304259"/>
-            <a:ext cx="8610600" cy="763206"/>
+            <a:off x="2140513" y="236423"/>
+            <a:ext cx="9365688" cy="947897"/>
           </a:xfrm>
         </p:spPr>
         <p:txBody>
@@ -7240,7 +7233,7 @@
           <a:p>
             <a:r>
               <a:rPr lang="en-US" dirty="0" smtClean="0"/>
-              <a:t>Teacher – Student Password reset</a:t>
+              <a:t>Teacher – Student Worksheet history </a:t>
             </a:r>
             <a:endParaRPr lang="en-US" dirty="0"/>
           </a:p>
@@ -7248,7 +7241,7 @@
       </p:sp>
       <p:pic>
         <p:nvPicPr>
-          <p:cNvPr id="4" name="Content Placeholder 3"/>
+          <p:cNvPr id="5" name="Content Placeholder 4"/>
           <p:cNvPicPr>
             <a:picLocks noGrp="1" noChangeAspect="1"/>
           </p:cNvPicPr>
@@ -7257,23 +7250,28 @@
           </p:nvPr>
         </p:nvPicPr>
         <p:blipFill>
-          <a:blip r:embed="rId2"/>
-          <a:srcRect l="-21814" r="-21814"/>
+          <a:blip r:embed="rId2">
+            <a:extLst>
+              <a:ext uri="{28A0092B-C50C-407E-A947-70E740481C1C}">
+                <a14:useLocalDpi xmlns:a14="http://schemas.microsoft.com/office/drawing/2010/main" val="0"/>
+              </a:ext>
+            </a:extLst>
+          </a:blip>
           <a:stretch>
             <a:fillRect/>
           </a:stretch>
         </p:blipFill>
         <p:spPr>
           <a:xfrm>
-            <a:off x="0" y="1455037"/>
-            <a:ext cx="12192000" cy="5133795"/>
+            <a:off x="1521501" y="1347019"/>
+            <a:ext cx="8517234" cy="5323272"/>
           </a:xfrm>
         </p:spPr>
       </p:pic>
     </p:spTree>
     <p:extLst>
       <p:ext uri="{BB962C8B-B14F-4D97-AF65-F5344CB8AC3E}">
-        <p14:creationId xmlns:p14="http://schemas.microsoft.com/office/powerpoint/2010/main" val="2743950604"/>
+        <p14:creationId xmlns:p14="http://schemas.microsoft.com/office/powerpoint/2010/main" val="726405238"/>
       </p:ext>
     </p:extLst>
   </p:cSld>
@@ -7331,17 +7329,19 @@
         </p:nvSpPr>
         <p:spPr>
           <a:xfrm>
-            <a:off x="2895600" y="117859"/>
-            <a:ext cx="8610600" cy="1023655"/>
-          </a:xfrm>
-        </p:spPr>
-        <p:txBody>
-          <a:bodyPr/>
+            <a:off x="3024445" y="304259"/>
+            <a:ext cx="8610600" cy="763206"/>
+          </a:xfrm>
+        </p:spPr>
+        <p:txBody>
+          <a:bodyPr>
+            <a:normAutofit fontScale="90000"/>
+          </a:bodyPr>
           <a:lstStyle/>
           <a:p>
             <a:r>
               <a:rPr lang="en-US" dirty="0" smtClean="0"/>
-              <a:t>Student  - home</a:t>
+              <a:t>Teacher – Student Password reset</a:t>
             </a:r>
             <a:endParaRPr lang="en-US" dirty="0"/>
           </a:p>
@@ -7359,22 +7359,22 @@
         </p:nvPicPr>
         <p:blipFill>
           <a:blip r:embed="rId2"/>
-          <a:srcRect l="-15701" r="-15701"/>
+          <a:srcRect l="-21814" r="-21814"/>
           <a:stretch>
             <a:fillRect/>
           </a:stretch>
         </p:blipFill>
         <p:spPr>
           <a:xfrm>
-            <a:off x="331598" y="1369816"/>
-            <a:ext cx="11041252" cy="5251647"/>
+            <a:off x="0" y="1455037"/>
+            <a:ext cx="12192000" cy="5133795"/>
           </a:xfrm>
         </p:spPr>
       </p:pic>
     </p:spTree>
     <p:extLst>
       <p:ext uri="{BB962C8B-B14F-4D97-AF65-F5344CB8AC3E}">
-        <p14:creationId xmlns:p14="http://schemas.microsoft.com/office/powerpoint/2010/main" val="3287658632"/>
+        <p14:creationId xmlns:p14="http://schemas.microsoft.com/office/powerpoint/2010/main" val="2743950604"/>
       </p:ext>
     </p:extLst>
   </p:cSld>
@@ -7432,8 +7432,8 @@
         </p:nvSpPr>
         <p:spPr>
           <a:xfrm>
-            <a:off x="3153688" y="350574"/>
-            <a:ext cx="8352512" cy="947898"/>
+            <a:off x="2895600" y="117859"/>
+            <a:ext cx="8610600" cy="1023655"/>
           </a:xfrm>
         </p:spPr>
         <p:txBody>
@@ -7442,7 +7442,7 @@
           <a:p>
             <a:r>
               <a:rPr lang="en-US" dirty="0" smtClean="0"/>
-              <a:t>All users - tutorials</a:t>
+              <a:t>Student  - home</a:t>
             </a:r>
             <a:endParaRPr lang="en-US" dirty="0"/>
           </a:p>
@@ -7460,22 +7460,22 @@
         </p:nvPicPr>
         <p:blipFill>
           <a:blip r:embed="rId2"/>
-          <a:srcRect l="-20389" r="-20389"/>
+          <a:srcRect l="-15701" r="-15701"/>
           <a:stretch>
             <a:fillRect/>
           </a:stretch>
         </p:blipFill>
         <p:spPr>
           <a:xfrm>
-            <a:off x="282817" y="1438275"/>
-            <a:ext cx="11223383" cy="4982739"/>
+            <a:off x="331598" y="1369816"/>
+            <a:ext cx="11041252" cy="5251647"/>
           </a:xfrm>
         </p:spPr>
       </p:pic>
     </p:spTree>
     <p:extLst>
       <p:ext uri="{BB962C8B-B14F-4D97-AF65-F5344CB8AC3E}">
-        <p14:creationId xmlns:p14="http://schemas.microsoft.com/office/powerpoint/2010/main" val="1529212874"/>
+        <p14:creationId xmlns:p14="http://schemas.microsoft.com/office/powerpoint/2010/main" val="3287658632"/>
       </p:ext>
     </p:extLst>
   </p:cSld>
@@ -7533,8 +7533,8 @@
         </p:nvSpPr>
         <p:spPr>
           <a:xfrm>
-            <a:off x="3210768" y="264961"/>
-            <a:ext cx="8295432" cy="976435"/>
+            <a:off x="3153688" y="350574"/>
+            <a:ext cx="8352512" cy="947898"/>
           </a:xfrm>
         </p:spPr>
         <p:txBody>
@@ -7543,7 +7543,7 @@
           <a:p>
             <a:r>
               <a:rPr lang="en-US" dirty="0" smtClean="0"/>
-              <a:t>Single tutorial</a:t>
+              <a:t>All users - tutorials</a:t>
             </a:r>
             <a:endParaRPr lang="en-US" dirty="0"/>
           </a:p>
@@ -7561,22 +7561,22 @@
         </p:nvPicPr>
         <p:blipFill>
           <a:blip r:embed="rId2"/>
-          <a:srcRect l="-22903" r="-22903"/>
+          <a:srcRect l="-20389" r="-20389"/>
           <a:stretch>
             <a:fillRect/>
           </a:stretch>
         </p:blipFill>
         <p:spPr>
           <a:xfrm>
-            <a:off x="-88302" y="1412624"/>
-            <a:ext cx="11718328" cy="5023102"/>
+            <a:off x="282817" y="1438275"/>
+            <a:ext cx="11223383" cy="4982739"/>
           </a:xfrm>
         </p:spPr>
       </p:pic>
     </p:spTree>
     <p:extLst>
       <p:ext uri="{BB962C8B-B14F-4D97-AF65-F5344CB8AC3E}">
-        <p14:creationId xmlns:p14="http://schemas.microsoft.com/office/powerpoint/2010/main" val="51864230"/>
+        <p14:creationId xmlns:p14="http://schemas.microsoft.com/office/powerpoint/2010/main" val="1529212874"/>
       </p:ext>
     </p:extLst>
   </p:cSld>
@@ -7634,8 +7634,8 @@
         </p:nvSpPr>
         <p:spPr>
           <a:xfrm>
-            <a:off x="3396278" y="293498"/>
-            <a:ext cx="8109921" cy="933629"/>
+            <a:off x="3210768" y="264961"/>
+            <a:ext cx="8295432" cy="976435"/>
           </a:xfrm>
         </p:spPr>
         <p:txBody>
@@ -7644,7 +7644,7 @@
           <a:p>
             <a:r>
               <a:rPr lang="en-US" dirty="0" smtClean="0"/>
-              <a:t>Student worksheet history</a:t>
+              <a:t>Single tutorial</a:t>
             </a:r>
             <a:endParaRPr lang="en-US" dirty="0"/>
           </a:p>
@@ -7662,22 +7662,22 @@
         </p:nvPicPr>
         <p:blipFill>
           <a:blip r:embed="rId2"/>
-          <a:srcRect l="-21814" r="-21814"/>
+          <a:srcRect l="-22903" r="-22903"/>
           <a:stretch>
             <a:fillRect/>
           </a:stretch>
         </p:blipFill>
         <p:spPr>
           <a:xfrm>
-            <a:off x="-200723" y="1227127"/>
-            <a:ext cx="11968572" cy="5208155"/>
+            <a:off x="-88302" y="1412624"/>
+            <a:ext cx="11718328" cy="5023102"/>
           </a:xfrm>
         </p:spPr>
       </p:pic>
     </p:spTree>
     <p:extLst>
       <p:ext uri="{BB962C8B-B14F-4D97-AF65-F5344CB8AC3E}">
-        <p14:creationId xmlns:p14="http://schemas.microsoft.com/office/powerpoint/2010/main" val="1048728809"/>
+        <p14:creationId xmlns:p14="http://schemas.microsoft.com/office/powerpoint/2010/main" val="51864230"/>
       </p:ext>
     </p:extLst>
   </p:cSld>
@@ -7735,8 +7735,8 @@
         </p:nvSpPr>
         <p:spPr>
           <a:xfrm>
-            <a:off x="2895600" y="307768"/>
-            <a:ext cx="8610600" cy="1004973"/>
+            <a:off x="3396278" y="293498"/>
+            <a:ext cx="8109921" cy="933629"/>
           </a:xfrm>
         </p:spPr>
         <p:txBody>
@@ -7745,7 +7745,7 @@
           <a:p>
             <a:r>
               <a:rPr lang="en-US" dirty="0" smtClean="0"/>
-              <a:t>help</a:t>
+              <a:t>Student worksheet history</a:t>
             </a:r>
             <a:endParaRPr lang="en-US" dirty="0"/>
           </a:p>
@@ -7763,22 +7763,22 @@
         </p:nvPicPr>
         <p:blipFill>
           <a:blip r:embed="rId2"/>
-          <a:srcRect l="-21228" r="-21228"/>
+          <a:srcRect l="-21814" r="-21814"/>
           <a:stretch>
             <a:fillRect/>
           </a:stretch>
         </p:blipFill>
         <p:spPr>
           <a:xfrm>
-            <a:off x="-40281" y="1312741"/>
-            <a:ext cx="11805825" cy="5179617"/>
+            <a:off x="-200723" y="1227127"/>
+            <a:ext cx="11968572" cy="5208155"/>
           </a:xfrm>
         </p:spPr>
       </p:pic>
     </p:spTree>
     <p:extLst>
       <p:ext uri="{BB962C8B-B14F-4D97-AF65-F5344CB8AC3E}">
-        <p14:creationId xmlns:p14="http://schemas.microsoft.com/office/powerpoint/2010/main" val="1678947127"/>
+        <p14:creationId xmlns:p14="http://schemas.microsoft.com/office/powerpoint/2010/main" val="1048728809"/>
       </p:ext>
     </p:extLst>
   </p:cSld>
@@ -7836,8 +7836,8 @@
         </p:nvSpPr>
         <p:spPr>
           <a:xfrm>
-            <a:off x="2915265" y="424263"/>
-            <a:ext cx="8610600" cy="1293028"/>
+            <a:off x="2895600" y="307768"/>
+            <a:ext cx="8610600" cy="1004973"/>
           </a:xfrm>
         </p:spPr>
         <p:txBody>
@@ -7846,7 +7846,7 @@
           <a:p>
             <a:r>
               <a:rPr lang="en-US" dirty="0" smtClean="0"/>
-              <a:t>My Account</a:t>
+              <a:t>help</a:t>
             </a:r>
             <a:endParaRPr lang="en-US" dirty="0"/>
           </a:p>
@@ -7863,28 +7863,23 @@
           </p:nvPr>
         </p:nvPicPr>
         <p:blipFill>
-          <a:blip r:embed="rId2">
-            <a:extLst>
-              <a:ext uri="{28A0092B-C50C-407E-A947-70E740481C1C}">
-                <a14:useLocalDpi xmlns:a14="http://schemas.microsoft.com/office/drawing/2010/main" val="0"/>
-              </a:ext>
-            </a:extLst>
-          </a:blip>
+          <a:blip r:embed="rId2"/>
+          <a:srcRect l="-21228" r="-21228"/>
           <a:stretch>
             <a:fillRect/>
           </a:stretch>
         </p:blipFill>
         <p:spPr>
           <a:xfrm>
-            <a:off x="1788938" y="1514169"/>
-            <a:ext cx="8306291" cy="5191432"/>
+            <a:off x="-40281" y="1312741"/>
+            <a:ext cx="11805825" cy="5179617"/>
           </a:xfrm>
         </p:spPr>
       </p:pic>
     </p:spTree>
     <p:extLst>
       <p:ext uri="{BB962C8B-B14F-4D97-AF65-F5344CB8AC3E}">
-        <p14:creationId xmlns:p14="http://schemas.microsoft.com/office/powerpoint/2010/main" val="2036564000"/>
+        <p14:creationId xmlns:p14="http://schemas.microsoft.com/office/powerpoint/2010/main" val="1678947127"/>
       </p:ext>
     </p:extLst>
   </p:cSld>
@@ -7903,6 +7898,13 @@
       </p:transition>
     </mc:Fallback>
   </mc:AlternateContent>
+  <p:timing>
+    <p:tnLst>
+      <p:par>
+        <p:cTn id="1" dur="indefinite" restart="never" nodeType="tmRoot"/>
+      </p:par>
+    </p:tnLst>
+  </p:timing>
 </p:sld>
 </file>
 
@@ -7935,8 +7937,8 @@
         </p:nvSpPr>
         <p:spPr>
           <a:xfrm>
-            <a:off x="5758611" y="0"/>
-            <a:ext cx="5705168" cy="1293028"/>
+            <a:off x="2915265" y="424263"/>
+            <a:ext cx="8610600" cy="1293028"/>
           </a:xfrm>
         </p:spPr>
         <p:txBody>
@@ -7944,12 +7946,8 @@
           <a:lstStyle/>
           <a:p>
             <a:r>
-              <a:rPr lang="en-US" smtClean="0"/>
-              <a:t>Graphical </a:t>
-            </a:r>
-            <a:r>
               <a:rPr lang="en-US" dirty="0" smtClean="0"/>
-              <a:t>Mockup</a:t>
+              <a:t>My Account</a:t>
             </a:r>
             <a:endParaRPr lang="en-US" dirty="0"/>
           </a:p>
@@ -7979,6 +7977,116 @@
         </p:blipFill>
         <p:spPr>
           <a:xfrm>
+            <a:off x="1788938" y="1514169"/>
+            <a:ext cx="8306291" cy="5191432"/>
+          </a:xfrm>
+        </p:spPr>
+      </p:pic>
+    </p:spTree>
+    <p:extLst>
+      <p:ext uri="{BB962C8B-B14F-4D97-AF65-F5344CB8AC3E}">
+        <p14:creationId xmlns:p14="http://schemas.microsoft.com/office/powerpoint/2010/main" val="2036564000"/>
+      </p:ext>
+    </p:extLst>
+  </p:cSld>
+  <p:clrMapOvr>
+    <a:masterClrMapping/>
+  </p:clrMapOvr>
+  <mc:AlternateContent xmlns:mc="http://schemas.openxmlformats.org/markup-compatibility/2006" xmlns:p14="http://schemas.microsoft.com/office/powerpoint/2010/main">
+    <mc:Choice Requires="p14">
+      <p:transition spd="slow">
+        <p14:reveal/>
+      </p:transition>
+    </mc:Choice>
+    <mc:Fallback xmlns="">
+      <p:transition spd="slow">
+        <p:fade/>
+      </p:transition>
+    </mc:Fallback>
+  </mc:AlternateContent>
+  <p:timing>
+    <p:tnLst>
+      <p:par>
+        <p:cTn id="1" dur="indefinite" restart="never" nodeType="tmRoot"/>
+      </p:par>
+    </p:tnLst>
+  </p:timing>
+</p:sld>
+</file>
+
+<file path=ppt/slides/slide28.xml><?xml version="1.0" encoding="utf-8"?>
+<p:sld xmlns:a="http://schemas.openxmlformats.org/drawingml/2006/main" xmlns:r="http://schemas.openxmlformats.org/officeDocument/2006/relationships" xmlns:p="http://schemas.openxmlformats.org/presentationml/2006/main">
+  <p:cSld>
+    <p:spTree>
+      <p:nvGrpSpPr>
+        <p:cNvPr id="1" name=""/>
+        <p:cNvGrpSpPr/>
+        <p:nvPr/>
+      </p:nvGrpSpPr>
+      <p:grpSpPr>
+        <a:xfrm>
+          <a:off x="0" y="0"/>
+          <a:ext cx="0" cy="0"/>
+          <a:chOff x="0" y="0"/>
+          <a:chExt cx="0" cy="0"/>
+        </a:xfrm>
+      </p:grpSpPr>
+      <p:sp>
+        <p:nvSpPr>
+          <p:cNvPr id="2" name="Title 1"/>
+          <p:cNvSpPr>
+            <a:spLocks noGrp="1"/>
+          </p:cNvSpPr>
+          <p:nvPr>
+            <p:ph type="title"/>
+          </p:nvPr>
+        </p:nvSpPr>
+        <p:spPr>
+          <a:xfrm>
+            <a:off x="5758611" y="0"/>
+            <a:ext cx="5705168" cy="1293028"/>
+          </a:xfrm>
+        </p:spPr>
+        <p:txBody>
+          <a:bodyPr/>
+          <a:lstStyle/>
+          <a:p>
+            <a:r>
+              <a:rPr lang="en-US" smtClean="0"/>
+              <a:t>Graphical </a:t>
+            </a:r>
+            <a:r>
+              <a:rPr lang="en-US" dirty="0" smtClean="0"/>
+              <a:t>Mockup</a:t>
+            </a:r>
+            <a:endParaRPr lang="en-US" dirty="0"/>
+          </a:p>
+        </p:txBody>
+      </p:sp>
+      <p:pic>
+        <p:nvPicPr>
+          <p:cNvPr id="4" name="Content Placeholder 3"/>
+          <p:cNvPicPr>
+            <a:picLocks noGrp="1" noChangeAspect="1"/>
+          </p:cNvPicPr>
+          <p:nvPr>
+            <p:ph idx="1"/>
+          </p:nvPr>
+        </p:nvPicPr>
+        <p:blipFill>
+          <a:blip r:embed="rId2">
+            <a:extLst>
+              <a:ext uri="{28A0092B-C50C-407E-A947-70E740481C1C}">
+                <a14:useLocalDpi xmlns:a14="http://schemas.microsoft.com/office/drawing/2010/main" val="0"/>
+              </a:ext>
+            </a:extLst>
+          </a:blip>
+          <a:stretch>
+            <a:fillRect/>
+          </a:stretch>
+        </p:blipFill>
+        <p:spPr>
+          <a:xfrm>
             <a:off x="2513676" y="1106215"/>
             <a:ext cx="6974649" cy="5579720"/>
           </a:xfrm>
@@ -8013,6 +8121,71 @@
       </p:par>
     </p:tnLst>
   </p:timing>
+</p:sld>
+</file>
+
+<file path=ppt/slides/slide29.xml><?xml version="1.0" encoding="utf-8"?>
+<p:sld xmlns:a="http://schemas.openxmlformats.org/drawingml/2006/main" xmlns:r="http://schemas.openxmlformats.org/officeDocument/2006/relationships" xmlns:p="http://schemas.openxmlformats.org/presentationml/2006/main">
+  <p:cSld>
+    <p:spTree>
+      <p:nvGrpSpPr>
+        <p:cNvPr id="1" name=""/>
+        <p:cNvGrpSpPr/>
+        <p:nvPr/>
+      </p:nvGrpSpPr>
+      <p:grpSpPr>
+        <a:xfrm>
+          <a:off x="0" y="0"/>
+          <a:ext cx="0" cy="0"/>
+          <a:chOff x="0" y="0"/>
+          <a:chExt cx="0" cy="0"/>
+        </a:xfrm>
+      </p:grpSpPr>
+      <p:sp>
+        <p:nvSpPr>
+          <p:cNvPr id="2" name="Title 1"/>
+          <p:cNvSpPr>
+            <a:spLocks noGrp="1"/>
+          </p:cNvSpPr>
+          <p:nvPr>
+            <p:ph type="title"/>
+          </p:nvPr>
+        </p:nvSpPr>
+        <p:spPr/>
+        <p:txBody>
+          <a:bodyPr/>
+          <a:lstStyle/>
+          <a:p>
+            <a:r>
+              <a:rPr lang="en-US" dirty="0" smtClean="0"/>
+              <a:t>Questions?</a:t>
+            </a:r>
+            <a:endParaRPr lang="en-US" dirty="0"/>
+          </a:p>
+        </p:txBody>
+      </p:sp>
+    </p:spTree>
+    <p:extLst>
+      <p:ext uri="{BB962C8B-B14F-4D97-AF65-F5344CB8AC3E}">
+        <p14:creationId xmlns:p14="http://schemas.microsoft.com/office/powerpoint/2010/main" val="344413050"/>
+      </p:ext>
+    </p:extLst>
+  </p:cSld>
+  <p:clrMapOvr>
+    <a:masterClrMapping/>
+  </p:clrMapOvr>
+  <mc:AlternateContent xmlns:mc="http://schemas.openxmlformats.org/markup-compatibility/2006" xmlns:p14="http://schemas.microsoft.com/office/powerpoint/2010/main">
+    <mc:Choice Requires="p14">
+      <p:transition spd="slow">
+        <p14:reveal/>
+      </p:transition>
+    </mc:Choice>
+    <mc:Fallback xmlns="">
+      <p:transition spd="slow">
+        <p:fade/>
+      </p:transition>
+    </mc:Fallback>
+  </mc:AlternateContent>
 </p:sld>
 </file>
 
@@ -8267,7 +8440,7 @@
       </p:sp>
       <p:pic>
         <p:nvPicPr>
-          <p:cNvPr id="4" name="Content Placeholder 3"/>
+          <p:cNvPr id="7" name="Content Placeholder 6"/>
           <p:cNvPicPr>
             <a:picLocks noGrp="1" noChangeAspect="1"/>
           </p:cNvPicPr>
@@ -8276,16 +8449,21 @@
           </p:nvPr>
         </p:nvPicPr>
         <p:blipFill>
-          <a:blip r:embed="rId2"/>
-          <a:srcRect l="-34024" r="-34024"/>
+          <a:blip r:embed="rId2">
+            <a:extLst>
+              <a:ext uri="{28A0092B-C50C-407E-A947-70E740481C1C}">
+                <a14:useLocalDpi xmlns:a14="http://schemas.microsoft.com/office/drawing/2010/main" val="0"/>
+              </a:ext>
+            </a:extLst>
+          </a:blip>
           <a:stretch>
             <a:fillRect/>
           </a:stretch>
         </p:blipFill>
         <p:spPr>
           <a:xfrm>
-            <a:off x="-374285" y="1233105"/>
-            <a:ext cx="12664755" cy="5337323"/>
+            <a:off x="1568695" y="1376516"/>
+            <a:ext cx="8450375" cy="5281485"/>
           </a:xfrm>
         </p:spPr>
       </p:pic>

</xml_diff>